<commit_message>
updated to fix spelling errors
</commit_message>
<xml_diff>
--- a/Project 1.pptx
+++ b/Project 1.pptx
@@ -8,11 +8,11 @@
     <p:sldId id="256" r:id="rId2"/>
     <p:sldId id="257" r:id="rId3"/>
     <p:sldId id="258" r:id="rId4"/>
-    <p:sldId id="266" r:id="rId5"/>
-    <p:sldId id="267" r:id="rId6"/>
-    <p:sldId id="275" r:id="rId7"/>
-    <p:sldId id="270" r:id="rId8"/>
-    <p:sldId id="274" r:id="rId9"/>
+    <p:sldId id="274" r:id="rId5"/>
+    <p:sldId id="266" r:id="rId6"/>
+    <p:sldId id="267" r:id="rId7"/>
+    <p:sldId id="275" r:id="rId8"/>
+    <p:sldId id="270" r:id="rId9"/>
     <p:sldId id="263" r:id="rId10"/>
     <p:sldId id="273" r:id="rId11"/>
   </p:sldIdLst>
@@ -6131,7 +6131,45 @@
                   </a:outerShdw>
                 </a:effectLst>
               </a:rPr>
-              <a:t>Ride sharing – Terminology used to group Uber, lift, etc. services</a:t>
+              <a:t>Ride sharing – Terminology used to group Uber, lift, </a:t>
+            </a:r>
+            <a:r>
+              <a:rPr lang="en-US" sz="1600" cap="small" dirty="0" err="1">
+                <a:effectLst>
+                  <a:glow rad="38100">
+                    <a:schemeClr val="bg1">
+                      <a:lumMod val="50000"/>
+                      <a:lumOff val="50000"/>
+                      <a:alpha val="20000"/>
+                    </a:schemeClr>
+                  </a:glow>
+                  <a:outerShdw blurRad="44450" dist="12700" dir="13860000" algn="tl" rotWithShape="0">
+                    <a:srgbClr val="000000">
+                      <a:alpha val="20000"/>
+                    </a:srgbClr>
+                  </a:outerShdw>
+                </a:effectLst>
+              </a:rPr>
+              <a:t>etc</a:t>
+            </a:r>
+            <a:r>
+              <a:rPr lang="en-US" sz="1600" cap="small" dirty="0">
+                <a:effectLst>
+                  <a:glow rad="38100">
+                    <a:schemeClr val="bg1">
+                      <a:lumMod val="50000"/>
+                      <a:lumOff val="50000"/>
+                      <a:alpha val="20000"/>
+                    </a:schemeClr>
+                  </a:glow>
+                  <a:outerShdw blurRad="44450" dist="12700" dir="13860000" algn="tl" rotWithShape="0">
+                    <a:srgbClr val="000000">
+                      <a:alpha val="20000"/>
+                    </a:srgbClr>
+                  </a:outerShdw>
+                </a:effectLst>
+              </a:rPr>
+              <a:t> services</a:t>
             </a:r>
           </a:p>
         </p:txBody>
@@ -6633,7 +6671,7 @@
           <p:cNvPr id="2" name="Title 1">
             <a:extLst>
               <a:ext uri="{FF2B5EF4-FFF2-40B4-BE49-F238E27FC236}">
-                <a16:creationId xmlns:a16="http://schemas.microsoft.com/office/drawing/2014/main" id="{D1C2A00E-7D49-6B47-B595-C08AE0AE6343}"/>
+                <a16:creationId xmlns:a16="http://schemas.microsoft.com/office/drawing/2014/main" id="{12DF547D-2983-8A4B-BA4B-0188AFAACBA7}"/>
               </a:ext>
             </a:extLst>
           </p:cNvPr>
@@ -6646,8 +6684,8 @@
         </p:nvSpPr>
         <p:spPr>
           <a:xfrm>
-            <a:off x="7467601" y="921774"/>
-            <a:ext cx="4709984" cy="907026"/>
+            <a:off x="7467600" y="914400"/>
+            <a:ext cx="5122606" cy="914400"/>
           </a:xfrm>
         </p:spPr>
         <p:txBody>
@@ -6657,18 +6695,18 @@
           <a:lstStyle/>
           <a:p>
             <a:r>
-              <a:rPr lang="en-US" sz="4400" dirty="0"/>
-              <a:t>Demographics</a:t>
-            </a:r>
-          </a:p>
-        </p:txBody>
-      </p:sp>
-      <p:sp>
-        <p:nvSpPr>
-          <p:cNvPr id="4" name="Content Placeholder 3">
+              <a:rPr lang="en-US" dirty="0"/>
+              <a:t>New York Taxis  </a:t>
+            </a:r>
+          </a:p>
+        </p:txBody>
+      </p:sp>
+      <p:sp>
+        <p:nvSpPr>
+          <p:cNvPr id="13" name="Content Placeholder 3">
             <a:extLst>
               <a:ext uri="{FF2B5EF4-FFF2-40B4-BE49-F238E27FC236}">
-                <a16:creationId xmlns:a16="http://schemas.microsoft.com/office/drawing/2014/main" id="{E746DCD3-DF3C-6A4F-A80D-46942662E5AB}"/>
+                <a16:creationId xmlns:a16="http://schemas.microsoft.com/office/drawing/2014/main" id="{2C335AAF-A1D5-A643-AB88-C93D00C1815D}"/>
               </a:ext>
             </a:extLst>
           </p:cNvPr>
@@ -6701,26 +6739,41 @@
           </a:p>
           <a:p>
             <a:r>
+              <a:rPr lang="en-US" dirty="0">
+                <a:effectLst/>
+              </a:rPr>
+              <a:t>Why did we include this slide / data?</a:t>
+            </a:r>
+          </a:p>
+          <a:p>
+            <a:r>
+              <a:rPr lang="en-US" dirty="0">
+                <a:effectLst/>
+              </a:rPr>
+              <a:t>What does the data show on taxi usage?</a:t>
+            </a:r>
+          </a:p>
+          <a:p>
+            <a:pPr marL="0" indent="0">
+              <a:buNone/>
+            </a:pPr>
+            <a:endParaRPr lang="en-US" dirty="0"/>
+          </a:p>
+          <a:p>
+            <a:pPr marL="0" indent="0">
+              <a:buNone/>
+            </a:pPr>
+            <a:r>
               <a:rPr lang="en-US" dirty="0"/>
-              <a:t>Why we choose San Diego and Dallas?</a:t>
-            </a:r>
-          </a:p>
-          <a:p>
-            <a:r>
-              <a:rPr lang="en-US" dirty="0"/>
-              <a:t>What is the average age of the rider?</a:t>
-            </a:r>
-          </a:p>
-          <a:p>
-            <a:endParaRPr lang="en-US" dirty="0"/>
-          </a:p>
-          <a:p>
-            <a:pPr marL="0" indent="0">
-              <a:buNone/>
-            </a:pPr>
-            <a:r>
-              <a:rPr lang="en-US" dirty="0"/>
-              <a:t>Insight</a:t>
+              <a:t>Insight:</a:t>
+            </a:r>
+          </a:p>
+          <a:p>
+            <a:r>
+              <a:rPr lang="en-US" dirty="0">
+                <a:effectLst/>
+              </a:rPr>
+              <a:t>Taxi driving is well defined and regulated in cities like New York. We collected yellow taxi data to understand recent trends in fares and miles driven. See fig below-</a:t>
             </a:r>
           </a:p>
           <a:p>
@@ -6728,23 +6781,26 @@
               <a:rPr lang="en-US" i="1" dirty="0">
                 <a:effectLst/>
               </a:rPr>
-              <a:t>The median ages and Population of San Diego and Dallas counties, are very similar . Good for our main question.</a:t>
+              <a:t>On an average, a taxi driver drives 3 miles and charges around $15 per trip. </a:t>
             </a:r>
             <a:endParaRPr lang="en-US" dirty="0">
               <a:effectLst/>
             </a:endParaRPr>
           </a:p>
           <a:p>
+            <a:pPr marL="0" indent="0">
+              <a:buNone/>
+            </a:pPr>
             <a:endParaRPr lang="en-US" dirty="0"/>
           </a:p>
         </p:txBody>
       </p:sp>
       <p:sp>
         <p:nvSpPr>
-          <p:cNvPr id="8" name="TextBox 7">
+          <p:cNvPr id="15" name="TextBox 14">
             <a:extLst>
               <a:ext uri="{FF2B5EF4-FFF2-40B4-BE49-F238E27FC236}">
-                <a16:creationId xmlns:a16="http://schemas.microsoft.com/office/drawing/2014/main" id="{B4DBECE5-A0FC-664C-B268-ACD1BFD6A0AB}"/>
+                <a16:creationId xmlns:a16="http://schemas.microsoft.com/office/drawing/2014/main" id="{B239CC83-BE04-D243-9487-985E3A9E8D08}"/>
               </a:ext>
             </a:extLst>
           </p:cNvPr>
@@ -6768,23 +6824,23 @@
           <a:lstStyle/>
           <a:p>
             <a:r>
-              <a:rPr lang="en-US" sz="1200" i="1" dirty="0"/>
+              <a:rPr lang="en-US" sz="1200" dirty="0"/>
               <a:t>source:   https://</a:t>
             </a:r>
             <a:r>
-              <a:rPr lang="en-US" sz="1200" i="1" dirty="0" err="1"/>
-              <a:t>suburbanstats.org</a:t>
-            </a:r>
-            <a:endParaRPr lang="en-US" sz="1200" i="1" dirty="0"/>
+              <a:rPr lang="en-US" sz="1200" dirty="0" err="1"/>
+              <a:t>opendata.cityofnewyork.us</a:t>
+            </a:r>
+            <a:endParaRPr lang="en-US" sz="1200" dirty="0"/>
           </a:p>
         </p:txBody>
       </p:sp>
       <p:pic>
         <p:nvPicPr>
-          <p:cNvPr id="5" name="Picture 4" descr="A screenshot of a cell phone&#10;&#10;Description automatically generated">
+          <p:cNvPr id="4" name="Picture 3" descr="A screenshot of a cell phone&#10;&#10;Description automatically generated">
             <a:extLst>
               <a:ext uri="{FF2B5EF4-FFF2-40B4-BE49-F238E27FC236}">
-                <a16:creationId xmlns:a16="http://schemas.microsoft.com/office/drawing/2014/main" id="{B906DF4C-F799-534E-B649-4BE332536632}"/>
+                <a16:creationId xmlns:a16="http://schemas.microsoft.com/office/drawing/2014/main" id="{28FFE712-9495-974C-9547-A5608AD7EC09}"/>
               </a:ext>
             </a:extLst>
           </p:cNvPr>
@@ -6801,38 +6857,8 @@
         </p:blipFill>
         <p:spPr>
           <a:xfrm>
-            <a:off x="245901" y="3594099"/>
-            <a:ext cx="5850100" cy="1379741"/>
-          </a:xfrm>
-          <a:prstGeom prst="rect">
-            <a:avLst/>
-          </a:prstGeom>
-        </p:spPr>
-      </p:pic>
-      <p:pic>
-        <p:nvPicPr>
-          <p:cNvPr id="12" name="Picture 11" descr="A screenshot of a cell phone&#10;&#10;Description automatically generated">
-            <a:extLst>
-              <a:ext uri="{FF2B5EF4-FFF2-40B4-BE49-F238E27FC236}">
-                <a16:creationId xmlns:a16="http://schemas.microsoft.com/office/drawing/2014/main" id="{0DA527E1-035D-5248-91CF-0343011322A9}"/>
-              </a:ext>
-            </a:extLst>
-          </p:cNvPr>
-          <p:cNvPicPr>
-            <a:picLocks noChangeAspect="1"/>
-          </p:cNvPicPr>
-          <p:nvPr/>
-        </p:nvPicPr>
-        <p:blipFill>
-          <a:blip r:embed="rId4"/>
-          <a:stretch>
-            <a:fillRect/>
-          </a:stretch>
-        </p:blipFill>
-        <p:spPr>
-          <a:xfrm>
-            <a:off x="245899" y="1828799"/>
-            <a:ext cx="5865165" cy="1285875"/>
+            <a:off x="309349" y="1828800"/>
+            <a:ext cx="5486400" cy="3657600"/>
           </a:xfrm>
           <a:prstGeom prst="rect">
             <a:avLst/>
@@ -6842,7 +6868,7 @@
     </p:spTree>
     <p:extLst>
       <p:ext uri="{BB962C8B-B14F-4D97-AF65-F5344CB8AC3E}">
-        <p14:creationId xmlns:p14="http://schemas.microsoft.com/office/powerpoint/2010/main" val="1742857253"/>
+        <p14:creationId xmlns:p14="http://schemas.microsoft.com/office/powerpoint/2010/main" val="2551876641"/>
       </p:ext>
     </p:extLst>
   </p:cSld>
@@ -6911,411 +6937,52 @@
         </p:nvSpPr>
         <p:spPr>
           <a:xfrm>
-            <a:off x="7467600" y="916458"/>
-            <a:ext cx="4724400" cy="912342"/>
+            <a:off x="7467601" y="921774"/>
+            <a:ext cx="4709984" cy="907026"/>
           </a:xfrm>
         </p:spPr>
         <p:txBody>
-          <a:bodyPr vert="horz" lIns="91440" tIns="45720" rIns="91440" bIns="45720" rtlCol="0" anchor="b">
+          <a:bodyPr vert="horz" lIns="91440" tIns="45720" rIns="91440" bIns="45720" rtlCol="0" anchor="ctr">
             <a:normAutofit/>
           </a:bodyPr>
           <a:lstStyle/>
           <a:p>
-            <a:pPr algn="ctr"/>
-            <a:r>
-              <a:rPr lang="en-US" sz="4400" dirty="0">
-                <a:effectLst>
-                  <a:glow rad="38100">
-                    <a:schemeClr val="bg1">
-                      <a:lumMod val="65000"/>
-                      <a:lumOff val="35000"/>
-                      <a:alpha val="50000"/>
-                    </a:schemeClr>
-                  </a:glow>
-                  <a:outerShdw blurRad="28575" dist="31750" dir="13200000" algn="tl" rotWithShape="0">
-                    <a:srgbClr val="000000">
-                      <a:alpha val="25000"/>
-                    </a:srgbClr>
-                  </a:outerShdw>
-                </a:effectLst>
-              </a:rPr>
-              <a:t>Establishments</a:t>
-            </a:r>
-            <a:endParaRPr lang="en-US" dirty="0">
-              <a:effectLst>
-                <a:glow rad="38100">
-                  <a:schemeClr val="bg1">
-                    <a:lumMod val="65000"/>
-                    <a:lumOff val="35000"/>
-                    <a:alpha val="50000"/>
-                  </a:schemeClr>
-                </a:glow>
-                <a:outerShdw blurRad="28575" dist="31750" dir="13200000" algn="tl" rotWithShape="0">
-                  <a:srgbClr val="000000">
-                    <a:alpha val="25000"/>
-                  </a:srgbClr>
-                </a:outerShdw>
-              </a:effectLst>
-            </a:endParaRPr>
-          </a:p>
-        </p:txBody>
-      </p:sp>
-      <p:sp>
-        <p:nvSpPr>
-          <p:cNvPr id="5" name="Content Placeholder 3">
+            <a:r>
+              <a:rPr lang="en-US" sz="4400" dirty="0"/>
+              <a:t>Demographics</a:t>
+            </a:r>
+          </a:p>
+        </p:txBody>
+      </p:sp>
+      <p:sp>
+        <p:nvSpPr>
+          <p:cNvPr id="4" name="Content Placeholder 3">
             <a:extLst>
               <a:ext uri="{FF2B5EF4-FFF2-40B4-BE49-F238E27FC236}">
-                <a16:creationId xmlns:a16="http://schemas.microsoft.com/office/drawing/2014/main" id="{AC1CAF84-DBFB-AB4A-AC26-FBCDE61A1DB3}"/>
+                <a16:creationId xmlns:a16="http://schemas.microsoft.com/office/drawing/2014/main" id="{E746DCD3-DF3C-6A4F-A80D-46942662E5AB}"/>
               </a:ext>
             </a:extLst>
           </p:cNvPr>
-          <p:cNvSpPr txBox="1">
-            <a:spLocks/>
-          </p:cNvSpPr>
-          <p:nvPr/>
+          <p:cNvSpPr>
+            <a:spLocks noGrp="1"/>
+          </p:cNvSpPr>
+          <p:nvPr>
+            <p:ph sz="half" idx="1"/>
+          </p:nvPr>
         </p:nvSpPr>
         <p:spPr>
           <a:xfrm>
-            <a:off x="7467600" y="1906765"/>
-            <a:ext cx="4233259" cy="4572000"/>
+            <a:off x="7467600" y="1828800"/>
+            <a:ext cx="4709984" cy="4572000"/>
           </a:xfrm>
-          <a:prstGeom prst="rect">
-            <a:avLst/>
-          </a:prstGeom>
         </p:spPr>
         <p:txBody>
           <a:bodyPr vert="horz" lIns="91440" tIns="45720" rIns="91440" bIns="45720" rtlCol="0" anchor="t">
             <a:normAutofit/>
           </a:bodyPr>
-          <a:lstStyle>
-            <a:lvl1pPr marL="285750" indent="-285750" algn="l" defTabSz="457200" rtl="0" eaLnBrk="1" latinLnBrk="0" hangingPunct="1">
-              <a:spcBef>
-                <a:spcPct val="20000"/>
-              </a:spcBef>
-              <a:spcAft>
-                <a:spcPts val="600"/>
-              </a:spcAft>
-              <a:buClr>
-                <a:schemeClr val="accent1"/>
-              </a:buClr>
-              <a:buSzPct val="100000"/>
-              <a:buFont typeface="Arial"/>
-              <a:buChar char="•"/>
-              <a:defRPr sz="1800" kern="1200" cap="small">
-                <a:solidFill>
-                  <a:schemeClr val="tx1"/>
-                </a:solidFill>
-                <a:effectLst>
-                  <a:glow rad="38100">
-                    <a:schemeClr val="bg1">
-                      <a:lumMod val="50000"/>
-                      <a:lumOff val="50000"/>
-                      <a:alpha val="20000"/>
-                    </a:schemeClr>
-                  </a:glow>
-                  <a:outerShdw blurRad="44450" dist="12700" dir="13860000" algn="tl" rotWithShape="0">
-                    <a:srgbClr val="000000">
-                      <a:alpha val="20000"/>
-                    </a:srgbClr>
-                  </a:outerShdw>
-                </a:effectLst>
-                <a:latin typeface="+mn-lt"/>
-                <a:ea typeface="+mn-ea"/>
-                <a:cs typeface="+mn-cs"/>
-              </a:defRPr>
-            </a:lvl1pPr>
-            <a:lvl2pPr marL="742950" indent="-285750" algn="l" defTabSz="457200" rtl="0" eaLnBrk="1" latinLnBrk="0" hangingPunct="1">
-              <a:spcBef>
-                <a:spcPct val="20000"/>
-              </a:spcBef>
-              <a:spcAft>
-                <a:spcPts val="600"/>
-              </a:spcAft>
-              <a:buClr>
-                <a:schemeClr val="accent1"/>
-              </a:buClr>
-              <a:buSzPct val="100000"/>
-              <a:buFont typeface="Arial"/>
-              <a:buChar char="•"/>
-              <a:defRPr sz="1600" kern="1200" cap="small">
-                <a:solidFill>
-                  <a:schemeClr val="tx1"/>
-                </a:solidFill>
-                <a:effectLst>
-                  <a:glow rad="38100">
-                    <a:schemeClr val="bg1">
-                      <a:lumMod val="50000"/>
-                      <a:lumOff val="50000"/>
-                      <a:alpha val="20000"/>
-                    </a:schemeClr>
-                  </a:glow>
-                  <a:outerShdw blurRad="44450" dist="12700" dir="13860000" algn="tl" rotWithShape="0">
-                    <a:srgbClr val="000000">
-                      <a:alpha val="20000"/>
-                    </a:srgbClr>
-                  </a:outerShdw>
-                </a:effectLst>
-                <a:latin typeface="+mn-lt"/>
-                <a:ea typeface="+mn-ea"/>
-                <a:cs typeface="+mn-cs"/>
-              </a:defRPr>
-            </a:lvl2pPr>
-            <a:lvl3pPr marL="1200150" indent="-285750" algn="l" defTabSz="457200" rtl="0" eaLnBrk="1" latinLnBrk="0" hangingPunct="1">
-              <a:spcBef>
-                <a:spcPct val="20000"/>
-              </a:spcBef>
-              <a:spcAft>
-                <a:spcPts val="600"/>
-              </a:spcAft>
-              <a:buClr>
-                <a:schemeClr val="accent1"/>
-              </a:buClr>
-              <a:buSzPct val="100000"/>
-              <a:buFont typeface="Arial"/>
-              <a:buChar char="•"/>
-              <a:defRPr sz="1400" kern="1200" cap="small">
-                <a:solidFill>
-                  <a:schemeClr val="tx1"/>
-                </a:solidFill>
-                <a:effectLst>
-                  <a:glow rad="38100">
-                    <a:schemeClr val="bg1">
-                      <a:lumMod val="50000"/>
-                      <a:lumOff val="50000"/>
-                      <a:alpha val="20000"/>
-                    </a:schemeClr>
-                  </a:glow>
-                  <a:outerShdw blurRad="44450" dist="12700" dir="13860000" algn="tl" rotWithShape="0">
-                    <a:srgbClr val="000000">
-                      <a:alpha val="20000"/>
-                    </a:srgbClr>
-                  </a:outerShdw>
-                </a:effectLst>
-                <a:latin typeface="+mn-lt"/>
-                <a:ea typeface="+mn-ea"/>
-                <a:cs typeface="+mn-cs"/>
-              </a:defRPr>
-            </a:lvl3pPr>
-            <a:lvl4pPr marL="1543050" indent="-171450" algn="l" defTabSz="457200" rtl="0" eaLnBrk="1" latinLnBrk="0" hangingPunct="1">
-              <a:spcBef>
-                <a:spcPct val="20000"/>
-              </a:spcBef>
-              <a:spcAft>
-                <a:spcPts val="600"/>
-              </a:spcAft>
-              <a:buClr>
-                <a:schemeClr val="accent1"/>
-              </a:buClr>
-              <a:buSzPct val="100000"/>
-              <a:buFont typeface="Arial"/>
-              <a:buChar char="•"/>
-              <a:defRPr sz="1200" kern="1200" cap="small">
-                <a:solidFill>
-                  <a:schemeClr val="tx1"/>
-                </a:solidFill>
-                <a:effectLst>
-                  <a:glow rad="38100">
-                    <a:schemeClr val="bg1">
-                      <a:lumMod val="50000"/>
-                      <a:lumOff val="50000"/>
-                      <a:alpha val="20000"/>
-                    </a:schemeClr>
-                  </a:glow>
-                  <a:outerShdw blurRad="44450" dist="12700" dir="13860000" algn="tl" rotWithShape="0">
-                    <a:srgbClr val="000000">
-                      <a:alpha val="20000"/>
-                    </a:srgbClr>
-                  </a:outerShdw>
-                </a:effectLst>
-                <a:latin typeface="+mn-lt"/>
-                <a:ea typeface="+mn-ea"/>
-                <a:cs typeface="+mn-cs"/>
-              </a:defRPr>
-            </a:lvl4pPr>
-            <a:lvl5pPr marL="2000250" indent="-171450" algn="l" defTabSz="457200" rtl="0" eaLnBrk="1" latinLnBrk="0" hangingPunct="1">
-              <a:spcBef>
-                <a:spcPct val="20000"/>
-              </a:spcBef>
-              <a:spcAft>
-                <a:spcPts val="600"/>
-              </a:spcAft>
-              <a:buClr>
-                <a:schemeClr val="accent1"/>
-              </a:buClr>
-              <a:buSzPct val="100000"/>
-              <a:buFont typeface="Arial"/>
-              <a:buChar char="•"/>
-              <a:defRPr sz="1200" kern="1200" cap="small">
-                <a:solidFill>
-                  <a:schemeClr val="tx1"/>
-                </a:solidFill>
-                <a:effectLst>
-                  <a:glow rad="38100">
-                    <a:schemeClr val="bg1">
-                      <a:lumMod val="50000"/>
-                      <a:lumOff val="50000"/>
-                      <a:alpha val="20000"/>
-                    </a:schemeClr>
-                  </a:glow>
-                  <a:outerShdw blurRad="44450" dist="12700" dir="13860000" algn="tl" rotWithShape="0">
-                    <a:srgbClr val="000000">
-                      <a:alpha val="20000"/>
-                    </a:srgbClr>
-                  </a:outerShdw>
-                </a:effectLst>
-                <a:latin typeface="+mn-lt"/>
-                <a:ea typeface="+mn-ea"/>
-                <a:cs typeface="+mn-cs"/>
-              </a:defRPr>
-            </a:lvl5pPr>
-            <a:lvl6pPr marL="2514600" indent="-228600" algn="l" defTabSz="457200" rtl="0" eaLnBrk="1" latinLnBrk="0" hangingPunct="1">
-              <a:spcBef>
-                <a:spcPct val="20000"/>
-              </a:spcBef>
-              <a:spcAft>
-                <a:spcPts val="600"/>
-              </a:spcAft>
-              <a:buClr>
-                <a:schemeClr val="accent1"/>
-              </a:buClr>
-              <a:buSzPct val="100000"/>
-              <a:buFont typeface="Arial"/>
-              <a:buChar char="•"/>
-              <a:defRPr sz="1200" kern="1200" cap="small">
-                <a:solidFill>
-                  <a:schemeClr val="tx1"/>
-                </a:solidFill>
-                <a:effectLst>
-                  <a:glow rad="38100">
-                    <a:schemeClr val="bg1">
-                      <a:lumMod val="50000"/>
-                      <a:lumOff val="50000"/>
-                      <a:alpha val="20000"/>
-                    </a:schemeClr>
-                  </a:glow>
-                  <a:outerShdw blurRad="44450" dist="12700" dir="13860000" algn="tl" rotWithShape="0">
-                    <a:srgbClr val="000000">
-                      <a:alpha val="20000"/>
-                    </a:srgbClr>
-                  </a:outerShdw>
-                </a:effectLst>
-                <a:latin typeface="+mn-lt"/>
-                <a:ea typeface="+mn-ea"/>
-                <a:cs typeface="+mn-cs"/>
-              </a:defRPr>
-            </a:lvl6pPr>
-            <a:lvl7pPr marL="2971800" indent="-228600" algn="l" defTabSz="457200" rtl="0" eaLnBrk="1" latinLnBrk="0" hangingPunct="1">
-              <a:spcBef>
-                <a:spcPct val="20000"/>
-              </a:spcBef>
-              <a:spcAft>
-                <a:spcPts val="600"/>
-              </a:spcAft>
-              <a:buClr>
-                <a:schemeClr val="accent1"/>
-              </a:buClr>
-              <a:buSzPct val="100000"/>
-              <a:buFont typeface="Arial"/>
-              <a:buChar char="•"/>
-              <a:defRPr sz="1200" kern="1200" cap="small">
-                <a:solidFill>
-                  <a:schemeClr val="tx1"/>
-                </a:solidFill>
-                <a:effectLst>
-                  <a:glow rad="38100">
-                    <a:schemeClr val="bg1">
-                      <a:lumMod val="50000"/>
-                      <a:lumOff val="50000"/>
-                      <a:alpha val="20000"/>
-                    </a:schemeClr>
-                  </a:glow>
-                  <a:outerShdw blurRad="44450" dist="12700" dir="13860000" algn="tl" rotWithShape="0">
-                    <a:srgbClr val="000000">
-                      <a:alpha val="20000"/>
-                    </a:srgbClr>
-                  </a:outerShdw>
-                </a:effectLst>
-                <a:latin typeface="+mn-lt"/>
-                <a:ea typeface="+mn-ea"/>
-                <a:cs typeface="+mn-cs"/>
-              </a:defRPr>
-            </a:lvl7pPr>
-            <a:lvl8pPr marL="3429000" indent="-228600" algn="l" defTabSz="457200" rtl="0" eaLnBrk="1" latinLnBrk="0" hangingPunct="1">
-              <a:spcBef>
-                <a:spcPct val="20000"/>
-              </a:spcBef>
-              <a:spcAft>
-                <a:spcPts val="600"/>
-              </a:spcAft>
-              <a:buClr>
-                <a:schemeClr val="accent1"/>
-              </a:buClr>
-              <a:buSzPct val="100000"/>
-              <a:buFont typeface="Arial"/>
-              <a:buChar char="•"/>
-              <a:defRPr sz="1200" kern="1200" cap="small">
-                <a:solidFill>
-                  <a:schemeClr val="tx1"/>
-                </a:solidFill>
-                <a:effectLst>
-                  <a:glow rad="38100">
-                    <a:schemeClr val="bg1">
-                      <a:lumMod val="50000"/>
-                      <a:lumOff val="50000"/>
-                      <a:alpha val="20000"/>
-                    </a:schemeClr>
-                  </a:glow>
-                  <a:outerShdw blurRad="44450" dist="12700" dir="13860000" algn="tl" rotWithShape="0">
-                    <a:srgbClr val="000000">
-                      <a:alpha val="20000"/>
-                    </a:srgbClr>
-                  </a:outerShdw>
-                </a:effectLst>
-                <a:latin typeface="+mn-lt"/>
-                <a:ea typeface="+mn-ea"/>
-                <a:cs typeface="+mn-cs"/>
-              </a:defRPr>
-            </a:lvl8pPr>
-            <a:lvl9pPr marL="3886200" indent="-228600" algn="l" defTabSz="457200" rtl="0" eaLnBrk="1" latinLnBrk="0" hangingPunct="1">
-              <a:spcBef>
-                <a:spcPct val="20000"/>
-              </a:spcBef>
-              <a:spcAft>
-                <a:spcPts val="600"/>
-              </a:spcAft>
-              <a:buClr>
-                <a:schemeClr val="accent1"/>
-              </a:buClr>
-              <a:buSzPct val="100000"/>
-              <a:buFont typeface="Arial"/>
-              <a:buChar char="•"/>
-              <a:defRPr sz="1200" kern="1200" cap="small">
-                <a:solidFill>
-                  <a:schemeClr val="tx1"/>
-                </a:solidFill>
-                <a:effectLst>
-                  <a:glow rad="38100">
-                    <a:schemeClr val="bg1">
-                      <a:lumMod val="50000"/>
-                      <a:lumOff val="50000"/>
-                      <a:alpha val="20000"/>
-                    </a:schemeClr>
-                  </a:glow>
-                  <a:outerShdw blurRad="44450" dist="12700" dir="13860000" algn="tl" rotWithShape="0">
-                    <a:srgbClr val="000000">
-                      <a:alpha val="20000"/>
-                    </a:srgbClr>
-                  </a:outerShdw>
-                </a:effectLst>
-                <a:latin typeface="+mn-lt"/>
-                <a:ea typeface="+mn-ea"/>
-                <a:cs typeface="+mn-cs"/>
-              </a:defRPr>
-            </a:lvl9pPr>
-          </a:lstStyle>
+          <a:lstStyle/>
           <a:p>
             <a:pPr marL="0" indent="0">
-              <a:buFont typeface="Arial"/>
               <a:buNone/>
             </a:pPr>
             <a:r>
@@ -7326,7 +6993,13 @@
           <a:p>
             <a:r>
               <a:rPr lang="en-US" dirty="0"/>
-              <a:t>How many companies are involved in Ride handling?</a:t>
+              <a:t>Why we choose San Diego and Dallas?</a:t>
+            </a:r>
+          </a:p>
+          <a:p>
+            <a:r>
+              <a:rPr lang="en-US" dirty="0"/>
+              <a:t>What is the average age of the rider?</a:t>
             </a:r>
           </a:p>
           <a:p>
@@ -7334,7 +7007,6 @@
           </a:p>
           <a:p>
             <a:pPr marL="0" indent="0">
-              <a:buFont typeface="Arial"/>
               <a:buNone/>
             </a:pPr>
             <a:r>
@@ -7347,7 +7019,7 @@
               <a:rPr lang="en-US" i="1" dirty="0">
                 <a:effectLst/>
               </a:rPr>
-              <a:t>Both counties have seen a decline in the number of establishments</a:t>
+              <a:t>The median ages and Population of San Diego and Dallas counties, are very similar . Good for our main question.</a:t>
             </a:r>
             <a:endParaRPr lang="en-US" dirty="0">
               <a:effectLst/>
@@ -7363,7 +7035,7 @@
           <p:cNvPr id="8" name="TextBox 7">
             <a:extLst>
               <a:ext uri="{FF2B5EF4-FFF2-40B4-BE49-F238E27FC236}">
-                <a16:creationId xmlns:a16="http://schemas.microsoft.com/office/drawing/2014/main" id="{217510DE-64A2-4C41-9B92-375416397A5A}"/>
+                <a16:creationId xmlns:a16="http://schemas.microsoft.com/office/drawing/2014/main" id="{B4DBECE5-A0FC-664C-B268-ACD1BFD6A0AB}"/>
               </a:ext>
             </a:extLst>
           </p:cNvPr>
@@ -7372,8 +7044,8 @@
         </p:nvSpPr>
         <p:spPr>
           <a:xfrm>
-            <a:off x="7467600" y="6414071"/>
-            <a:ext cx="4648200" cy="276999"/>
+            <a:off x="7405816" y="6414071"/>
+            <a:ext cx="4709984" cy="276999"/>
           </a:xfrm>
           <a:prstGeom prst="rect">
             <a:avLst/>
@@ -7392,7 +7064,7 @@
             </a:r>
             <a:r>
               <a:rPr lang="en-US" sz="1200" i="1" dirty="0" err="1"/>
-              <a:t>www.bls.gov</a:t>
+              <a:t>suburbanstats.org</a:t>
             </a:r>
             <a:endParaRPr lang="en-US" sz="1200" i="1" dirty="0"/>
           </a:p>
@@ -7400,10 +7072,39 @@
       </p:sp>
       <p:pic>
         <p:nvPicPr>
-          <p:cNvPr id="4" name="Picture 3" descr="A close up of a map&#10;&#10;Description automatically generated">
+          <p:cNvPr id="10" name="Content Placeholder 9" descr="A screenshot of a cell phone&#10;&#10;Description automatically generated">
             <a:extLst>
               <a:ext uri="{FF2B5EF4-FFF2-40B4-BE49-F238E27FC236}">
-                <a16:creationId xmlns:a16="http://schemas.microsoft.com/office/drawing/2014/main" id="{1FAE42E0-7FA1-4E40-A05F-3DB7C96A5D26}"/>
+                <a16:creationId xmlns:a16="http://schemas.microsoft.com/office/drawing/2014/main" id="{41490527-C6B3-B743-A74E-B06C78417777}"/>
+              </a:ext>
+            </a:extLst>
+          </p:cNvPr>
+          <p:cNvPicPr>
+            <a:picLocks noGrp="1" noChangeAspect="1"/>
+          </p:cNvPicPr>
+          <p:nvPr>
+            <p:ph sz="half" idx="2"/>
+          </p:nvPr>
+        </p:nvPicPr>
+        <p:blipFill>
+          <a:blip r:embed="rId3"/>
+          <a:stretch>
+            <a:fillRect/>
+          </a:stretch>
+        </p:blipFill>
+        <p:spPr>
+          <a:xfrm>
+            <a:off x="208532" y="1828799"/>
+            <a:ext cx="5891484" cy="1295142"/>
+          </a:xfrm>
+        </p:spPr>
+      </p:pic>
+      <p:pic>
+        <p:nvPicPr>
+          <p:cNvPr id="12" name="Picture 11" descr="A screenshot of a cell phone&#10;&#10;Description automatically generated">
+            <a:extLst>
+              <a:ext uri="{FF2B5EF4-FFF2-40B4-BE49-F238E27FC236}">
+                <a16:creationId xmlns:a16="http://schemas.microsoft.com/office/drawing/2014/main" id="{317EA95A-C4B1-FF46-9B26-C59D6251B3E3}"/>
               </a:ext>
             </a:extLst>
           </p:cNvPr>
@@ -7413,15 +7114,15 @@
           <p:nvPr/>
         </p:nvPicPr>
         <p:blipFill>
-          <a:blip r:embed="rId3"/>
+          <a:blip r:embed="rId4"/>
           <a:stretch>
             <a:fillRect/>
           </a:stretch>
         </p:blipFill>
         <p:spPr>
           <a:xfrm>
-            <a:off x="377588" y="1828800"/>
-            <a:ext cx="5486400" cy="3657600"/>
+            <a:off x="216986" y="3220494"/>
+            <a:ext cx="5891484" cy="1406097"/>
           </a:xfrm>
           <a:prstGeom prst="rect">
             <a:avLst/>
@@ -7431,7 +7132,7 @@
     </p:spTree>
     <p:extLst>
       <p:ext uri="{BB962C8B-B14F-4D97-AF65-F5344CB8AC3E}">
-        <p14:creationId xmlns:p14="http://schemas.microsoft.com/office/powerpoint/2010/main" val="159405912"/>
+        <p14:creationId xmlns:p14="http://schemas.microsoft.com/office/powerpoint/2010/main" val="1742857253"/>
       </p:ext>
     </p:extLst>
   </p:cSld>
@@ -7500,8 +7201,8 @@
         </p:nvSpPr>
         <p:spPr>
           <a:xfrm>
-            <a:off x="988630" y="4363271"/>
-            <a:ext cx="10200986" cy="1066801"/>
+            <a:off x="7467600" y="916458"/>
+            <a:ext cx="4724400" cy="912342"/>
           </a:xfrm>
         </p:spPr>
         <p:txBody>
@@ -7512,7 +7213,7 @@
           <a:p>
             <a:pPr algn="ctr"/>
             <a:r>
-              <a:rPr lang="en-US" sz="4800" dirty="0">
+              <a:rPr lang="en-US" sz="4400" dirty="0">
                 <a:effectLst>
                   <a:glow rad="38100">
                     <a:schemeClr val="bg1">
@@ -7528,93 +7229,53 @@
                   </a:outerShdw>
                 </a:effectLst>
               </a:rPr>
-              <a:t>Employees  and wages</a:t>
-            </a:r>
-          </a:p>
-        </p:txBody>
-      </p:sp>
-      <p:pic>
-        <p:nvPicPr>
-          <p:cNvPr id="10" name="Picture 9">
+              <a:t>Establishments</a:t>
+            </a:r>
+            <a:endParaRPr lang="en-US" dirty="0">
+              <a:effectLst>
+                <a:glow rad="38100">
+                  <a:schemeClr val="bg1">
+                    <a:lumMod val="65000"/>
+                    <a:lumOff val="35000"/>
+                    <a:alpha val="50000"/>
+                  </a:schemeClr>
+                </a:glow>
+                <a:outerShdw blurRad="28575" dist="31750" dir="13200000" algn="tl" rotWithShape="0">
+                  <a:srgbClr val="000000">
+                    <a:alpha val="25000"/>
+                  </a:srgbClr>
+                </a:outerShdw>
+              </a:effectLst>
+            </a:endParaRPr>
+          </a:p>
+        </p:txBody>
+      </p:sp>
+      <p:sp>
+        <p:nvSpPr>
+          <p:cNvPr id="5" name="Content Placeholder 3">
             <a:extLst>
               <a:ext uri="{FF2B5EF4-FFF2-40B4-BE49-F238E27FC236}">
-                <a16:creationId xmlns:a16="http://schemas.microsoft.com/office/drawing/2014/main" id="{79C23C12-7C11-FE46-9F41-F8B52BA376B4}"/>
+                <a16:creationId xmlns:a16="http://schemas.microsoft.com/office/drawing/2014/main" id="{AC1CAF84-DBFB-AB4A-AC26-FBCDE61A1DB3}"/>
               </a:ext>
             </a:extLst>
           </p:cNvPr>
-          <p:cNvPicPr/>
+          <p:cNvSpPr txBox="1">
+            <a:spLocks/>
+          </p:cNvSpPr>
           <p:nvPr/>
-        </p:nvPicPr>
-        <p:blipFill>
-          <a:blip r:embed="rId3"/>
-          <a:stretch>
-            <a:fillRect/>
-          </a:stretch>
-        </p:blipFill>
+        </p:nvSpPr>
         <p:spPr>
           <a:xfrm>
-            <a:off x="495501" y="750570"/>
-            <a:ext cx="5257108" cy="3646474"/>
+            <a:off x="7467600" y="1906765"/>
+            <a:ext cx="4233259" cy="4572000"/>
           </a:xfrm>
           <a:prstGeom prst="rect">
             <a:avLst/>
           </a:prstGeom>
         </p:spPr>
-      </p:pic>
-      <p:pic>
-        <p:nvPicPr>
-          <p:cNvPr id="11" name="Picture 10">
-            <a:extLst>
-              <a:ext uri="{FF2B5EF4-FFF2-40B4-BE49-F238E27FC236}">
-                <a16:creationId xmlns:a16="http://schemas.microsoft.com/office/drawing/2014/main" id="{6E4EEEA5-5282-064F-B778-449FC344665B}"/>
-              </a:ext>
-            </a:extLst>
-          </p:cNvPr>
-          <p:cNvPicPr/>
-          <p:nvPr/>
-        </p:nvPicPr>
-        <p:blipFill>
-          <a:blip r:embed="rId4"/>
-          <a:stretch>
-            <a:fillRect/>
-          </a:stretch>
-        </p:blipFill>
-        <p:spPr>
-          <a:xfrm>
-            <a:off x="6439392" y="750570"/>
-            <a:ext cx="4770475" cy="3646473"/>
-          </a:xfrm>
-          <a:prstGeom prst="rect">
-            <a:avLst/>
-          </a:prstGeom>
-        </p:spPr>
-      </p:pic>
-      <p:sp>
-        <p:nvSpPr>
-          <p:cNvPr id="14" name="Content Placeholder 3">
-            <a:extLst>
-              <a:ext uri="{FF2B5EF4-FFF2-40B4-BE49-F238E27FC236}">
-                <a16:creationId xmlns:a16="http://schemas.microsoft.com/office/drawing/2014/main" id="{E2712C58-A5DC-DD40-B3DA-A2DA195624F9}"/>
-              </a:ext>
-            </a:extLst>
-          </p:cNvPr>
-          <p:cNvSpPr txBox="1">
-            <a:spLocks/>
-          </p:cNvSpPr>
-          <p:nvPr/>
-        </p:nvSpPr>
-        <p:spPr>
-          <a:xfrm>
-            <a:off x="700348" y="5430071"/>
-            <a:ext cx="5274425" cy="1066801"/>
-          </a:xfrm>
-          <a:prstGeom prst="rect">
-            <a:avLst/>
-          </a:prstGeom>
-        </p:spPr>
         <p:txBody>
           <a:bodyPr vert="horz" lIns="91440" tIns="45720" rIns="91440" bIns="45720" rtlCol="0" anchor="t">
-            <a:normAutofit fontScale="47500" lnSpcReduction="20000"/>
+            <a:normAutofit/>
           </a:bodyPr>
           <a:lstStyle>
             <a:lvl1pPr marL="285750" indent="-285750" algn="l" defTabSz="457200" rtl="0" eaLnBrk="1" latinLnBrk="0" hangingPunct="1">
@@ -7948,407 +7609,51 @@
               <a:buNone/>
             </a:pPr>
             <a:r>
-              <a:rPr lang="en-US" sz="2900" dirty="0"/>
+              <a:rPr lang="en-US" dirty="0"/>
               <a:t>Questions Asked:</a:t>
             </a:r>
           </a:p>
           <a:p>
             <a:r>
-              <a:rPr lang="en-US" sz="2900" dirty="0"/>
-              <a:t>How  many employees work for these establishments?</a:t>
-            </a:r>
-          </a:p>
-          <a:p>
-            <a:r>
-              <a:rPr lang="en-US" sz="2900" dirty="0"/>
-              <a:t>How much money can you make Annually?</a:t>
+              <a:rPr lang="en-US" dirty="0"/>
+              <a:t>How many companies are involved in Ride handling?</a:t>
             </a:r>
           </a:p>
           <a:p>
             <a:endParaRPr lang="en-US" dirty="0"/>
           </a:p>
-        </p:txBody>
-      </p:sp>
-      <p:sp>
-        <p:nvSpPr>
-          <p:cNvPr id="15" name="Content Placeholder 3">
+          <a:p>
+            <a:pPr marL="0" indent="0">
+              <a:buFont typeface="Arial"/>
+              <a:buNone/>
+            </a:pPr>
+            <a:r>
+              <a:rPr lang="en-US" dirty="0"/>
+              <a:t>Insight</a:t>
+            </a:r>
+          </a:p>
+          <a:p>
+            <a:r>
+              <a:rPr lang="en-US" i="1" dirty="0">
+                <a:effectLst/>
+              </a:rPr>
+              <a:t>Both counties have seen a decline in the number of establishments</a:t>
+            </a:r>
+            <a:endParaRPr lang="en-US" dirty="0">
+              <a:effectLst/>
+            </a:endParaRPr>
+          </a:p>
+          <a:p>
+            <a:endParaRPr lang="en-US" dirty="0"/>
+          </a:p>
+        </p:txBody>
+      </p:sp>
+      <p:sp>
+        <p:nvSpPr>
+          <p:cNvPr id="8" name="TextBox 7">
             <a:extLst>
               <a:ext uri="{FF2B5EF4-FFF2-40B4-BE49-F238E27FC236}">
-                <a16:creationId xmlns:a16="http://schemas.microsoft.com/office/drawing/2014/main" id="{EB6E3117-CF79-374A-91F5-BBF8FE64EB26}"/>
-              </a:ext>
-            </a:extLst>
-          </p:cNvPr>
-          <p:cNvSpPr txBox="1">
-            <a:spLocks/>
-          </p:cNvSpPr>
-          <p:nvPr/>
-        </p:nvSpPr>
-        <p:spPr>
-          <a:xfrm>
-            <a:off x="6703859" y="5430072"/>
-            <a:ext cx="4787793" cy="945573"/>
-          </a:xfrm>
-          <a:prstGeom prst="rect">
-            <a:avLst/>
-          </a:prstGeom>
-        </p:spPr>
-        <p:txBody>
-          <a:bodyPr vert="horz" lIns="91440" tIns="45720" rIns="91440" bIns="45720" rtlCol="0" anchor="t">
-            <a:normAutofit lnSpcReduction="10000"/>
-          </a:bodyPr>
-          <a:lstStyle>
-            <a:lvl1pPr marL="285750" indent="-285750" algn="l" defTabSz="457200" rtl="0" eaLnBrk="1" latinLnBrk="0" hangingPunct="1">
-              <a:spcBef>
-                <a:spcPct val="20000"/>
-              </a:spcBef>
-              <a:spcAft>
-                <a:spcPts val="600"/>
-              </a:spcAft>
-              <a:buClr>
-                <a:schemeClr val="accent1"/>
-              </a:buClr>
-              <a:buSzPct val="100000"/>
-              <a:buFont typeface="Arial"/>
-              <a:buChar char="•"/>
-              <a:defRPr sz="1800" kern="1200" cap="small">
-                <a:solidFill>
-                  <a:schemeClr val="tx1"/>
-                </a:solidFill>
-                <a:effectLst>
-                  <a:glow rad="38100">
-                    <a:schemeClr val="bg1">
-                      <a:lumMod val="50000"/>
-                      <a:lumOff val="50000"/>
-                      <a:alpha val="20000"/>
-                    </a:schemeClr>
-                  </a:glow>
-                  <a:outerShdw blurRad="44450" dist="12700" dir="13860000" algn="tl" rotWithShape="0">
-                    <a:srgbClr val="000000">
-                      <a:alpha val="20000"/>
-                    </a:srgbClr>
-                  </a:outerShdw>
-                </a:effectLst>
-                <a:latin typeface="+mn-lt"/>
-                <a:ea typeface="+mn-ea"/>
-                <a:cs typeface="+mn-cs"/>
-              </a:defRPr>
-            </a:lvl1pPr>
-            <a:lvl2pPr marL="742950" indent="-285750" algn="l" defTabSz="457200" rtl="0" eaLnBrk="1" latinLnBrk="0" hangingPunct="1">
-              <a:spcBef>
-                <a:spcPct val="20000"/>
-              </a:spcBef>
-              <a:spcAft>
-                <a:spcPts val="600"/>
-              </a:spcAft>
-              <a:buClr>
-                <a:schemeClr val="accent1"/>
-              </a:buClr>
-              <a:buSzPct val="100000"/>
-              <a:buFont typeface="Arial"/>
-              <a:buChar char="•"/>
-              <a:defRPr sz="1600" kern="1200" cap="small">
-                <a:solidFill>
-                  <a:schemeClr val="tx1"/>
-                </a:solidFill>
-                <a:effectLst>
-                  <a:glow rad="38100">
-                    <a:schemeClr val="bg1">
-                      <a:lumMod val="50000"/>
-                      <a:lumOff val="50000"/>
-                      <a:alpha val="20000"/>
-                    </a:schemeClr>
-                  </a:glow>
-                  <a:outerShdw blurRad="44450" dist="12700" dir="13860000" algn="tl" rotWithShape="0">
-                    <a:srgbClr val="000000">
-                      <a:alpha val="20000"/>
-                    </a:srgbClr>
-                  </a:outerShdw>
-                </a:effectLst>
-                <a:latin typeface="+mn-lt"/>
-                <a:ea typeface="+mn-ea"/>
-                <a:cs typeface="+mn-cs"/>
-              </a:defRPr>
-            </a:lvl2pPr>
-            <a:lvl3pPr marL="1200150" indent="-285750" algn="l" defTabSz="457200" rtl="0" eaLnBrk="1" latinLnBrk="0" hangingPunct="1">
-              <a:spcBef>
-                <a:spcPct val="20000"/>
-              </a:spcBef>
-              <a:spcAft>
-                <a:spcPts val="600"/>
-              </a:spcAft>
-              <a:buClr>
-                <a:schemeClr val="accent1"/>
-              </a:buClr>
-              <a:buSzPct val="100000"/>
-              <a:buFont typeface="Arial"/>
-              <a:buChar char="•"/>
-              <a:defRPr sz="1400" kern="1200" cap="small">
-                <a:solidFill>
-                  <a:schemeClr val="tx1"/>
-                </a:solidFill>
-                <a:effectLst>
-                  <a:glow rad="38100">
-                    <a:schemeClr val="bg1">
-                      <a:lumMod val="50000"/>
-                      <a:lumOff val="50000"/>
-                      <a:alpha val="20000"/>
-                    </a:schemeClr>
-                  </a:glow>
-                  <a:outerShdw blurRad="44450" dist="12700" dir="13860000" algn="tl" rotWithShape="0">
-                    <a:srgbClr val="000000">
-                      <a:alpha val="20000"/>
-                    </a:srgbClr>
-                  </a:outerShdw>
-                </a:effectLst>
-                <a:latin typeface="+mn-lt"/>
-                <a:ea typeface="+mn-ea"/>
-                <a:cs typeface="+mn-cs"/>
-              </a:defRPr>
-            </a:lvl3pPr>
-            <a:lvl4pPr marL="1543050" indent="-171450" algn="l" defTabSz="457200" rtl="0" eaLnBrk="1" latinLnBrk="0" hangingPunct="1">
-              <a:spcBef>
-                <a:spcPct val="20000"/>
-              </a:spcBef>
-              <a:spcAft>
-                <a:spcPts val="600"/>
-              </a:spcAft>
-              <a:buClr>
-                <a:schemeClr val="accent1"/>
-              </a:buClr>
-              <a:buSzPct val="100000"/>
-              <a:buFont typeface="Arial"/>
-              <a:buChar char="•"/>
-              <a:defRPr sz="1200" kern="1200" cap="small">
-                <a:solidFill>
-                  <a:schemeClr val="tx1"/>
-                </a:solidFill>
-                <a:effectLst>
-                  <a:glow rad="38100">
-                    <a:schemeClr val="bg1">
-                      <a:lumMod val="50000"/>
-                      <a:lumOff val="50000"/>
-                      <a:alpha val="20000"/>
-                    </a:schemeClr>
-                  </a:glow>
-                  <a:outerShdw blurRad="44450" dist="12700" dir="13860000" algn="tl" rotWithShape="0">
-                    <a:srgbClr val="000000">
-                      <a:alpha val="20000"/>
-                    </a:srgbClr>
-                  </a:outerShdw>
-                </a:effectLst>
-                <a:latin typeface="+mn-lt"/>
-                <a:ea typeface="+mn-ea"/>
-                <a:cs typeface="+mn-cs"/>
-              </a:defRPr>
-            </a:lvl4pPr>
-            <a:lvl5pPr marL="2000250" indent="-171450" algn="l" defTabSz="457200" rtl="0" eaLnBrk="1" latinLnBrk="0" hangingPunct="1">
-              <a:spcBef>
-                <a:spcPct val="20000"/>
-              </a:spcBef>
-              <a:spcAft>
-                <a:spcPts val="600"/>
-              </a:spcAft>
-              <a:buClr>
-                <a:schemeClr val="accent1"/>
-              </a:buClr>
-              <a:buSzPct val="100000"/>
-              <a:buFont typeface="Arial"/>
-              <a:buChar char="•"/>
-              <a:defRPr sz="1200" kern="1200" cap="small">
-                <a:solidFill>
-                  <a:schemeClr val="tx1"/>
-                </a:solidFill>
-                <a:effectLst>
-                  <a:glow rad="38100">
-                    <a:schemeClr val="bg1">
-                      <a:lumMod val="50000"/>
-                      <a:lumOff val="50000"/>
-                      <a:alpha val="20000"/>
-                    </a:schemeClr>
-                  </a:glow>
-                  <a:outerShdw blurRad="44450" dist="12700" dir="13860000" algn="tl" rotWithShape="0">
-                    <a:srgbClr val="000000">
-                      <a:alpha val="20000"/>
-                    </a:srgbClr>
-                  </a:outerShdw>
-                </a:effectLst>
-                <a:latin typeface="+mn-lt"/>
-                <a:ea typeface="+mn-ea"/>
-                <a:cs typeface="+mn-cs"/>
-              </a:defRPr>
-            </a:lvl5pPr>
-            <a:lvl6pPr marL="2514600" indent="-228600" algn="l" defTabSz="457200" rtl="0" eaLnBrk="1" latinLnBrk="0" hangingPunct="1">
-              <a:spcBef>
-                <a:spcPct val="20000"/>
-              </a:spcBef>
-              <a:spcAft>
-                <a:spcPts val="600"/>
-              </a:spcAft>
-              <a:buClr>
-                <a:schemeClr val="accent1"/>
-              </a:buClr>
-              <a:buSzPct val="100000"/>
-              <a:buFont typeface="Arial"/>
-              <a:buChar char="•"/>
-              <a:defRPr sz="1200" kern="1200" cap="small">
-                <a:solidFill>
-                  <a:schemeClr val="tx1"/>
-                </a:solidFill>
-                <a:effectLst>
-                  <a:glow rad="38100">
-                    <a:schemeClr val="bg1">
-                      <a:lumMod val="50000"/>
-                      <a:lumOff val="50000"/>
-                      <a:alpha val="20000"/>
-                    </a:schemeClr>
-                  </a:glow>
-                  <a:outerShdw blurRad="44450" dist="12700" dir="13860000" algn="tl" rotWithShape="0">
-                    <a:srgbClr val="000000">
-                      <a:alpha val="20000"/>
-                    </a:srgbClr>
-                  </a:outerShdw>
-                </a:effectLst>
-                <a:latin typeface="+mn-lt"/>
-                <a:ea typeface="+mn-ea"/>
-                <a:cs typeface="+mn-cs"/>
-              </a:defRPr>
-            </a:lvl6pPr>
-            <a:lvl7pPr marL="2971800" indent="-228600" algn="l" defTabSz="457200" rtl="0" eaLnBrk="1" latinLnBrk="0" hangingPunct="1">
-              <a:spcBef>
-                <a:spcPct val="20000"/>
-              </a:spcBef>
-              <a:spcAft>
-                <a:spcPts val="600"/>
-              </a:spcAft>
-              <a:buClr>
-                <a:schemeClr val="accent1"/>
-              </a:buClr>
-              <a:buSzPct val="100000"/>
-              <a:buFont typeface="Arial"/>
-              <a:buChar char="•"/>
-              <a:defRPr sz="1200" kern="1200" cap="small">
-                <a:solidFill>
-                  <a:schemeClr val="tx1"/>
-                </a:solidFill>
-                <a:effectLst>
-                  <a:glow rad="38100">
-                    <a:schemeClr val="bg1">
-                      <a:lumMod val="50000"/>
-                      <a:lumOff val="50000"/>
-                      <a:alpha val="20000"/>
-                    </a:schemeClr>
-                  </a:glow>
-                  <a:outerShdw blurRad="44450" dist="12700" dir="13860000" algn="tl" rotWithShape="0">
-                    <a:srgbClr val="000000">
-                      <a:alpha val="20000"/>
-                    </a:srgbClr>
-                  </a:outerShdw>
-                </a:effectLst>
-                <a:latin typeface="+mn-lt"/>
-                <a:ea typeface="+mn-ea"/>
-                <a:cs typeface="+mn-cs"/>
-              </a:defRPr>
-            </a:lvl7pPr>
-            <a:lvl8pPr marL="3429000" indent="-228600" algn="l" defTabSz="457200" rtl="0" eaLnBrk="1" latinLnBrk="0" hangingPunct="1">
-              <a:spcBef>
-                <a:spcPct val="20000"/>
-              </a:spcBef>
-              <a:spcAft>
-                <a:spcPts val="600"/>
-              </a:spcAft>
-              <a:buClr>
-                <a:schemeClr val="accent1"/>
-              </a:buClr>
-              <a:buSzPct val="100000"/>
-              <a:buFont typeface="Arial"/>
-              <a:buChar char="•"/>
-              <a:defRPr sz="1200" kern="1200" cap="small">
-                <a:solidFill>
-                  <a:schemeClr val="tx1"/>
-                </a:solidFill>
-                <a:effectLst>
-                  <a:glow rad="38100">
-                    <a:schemeClr val="bg1">
-                      <a:lumMod val="50000"/>
-                      <a:lumOff val="50000"/>
-                      <a:alpha val="20000"/>
-                    </a:schemeClr>
-                  </a:glow>
-                  <a:outerShdw blurRad="44450" dist="12700" dir="13860000" algn="tl" rotWithShape="0">
-                    <a:srgbClr val="000000">
-                      <a:alpha val="20000"/>
-                    </a:srgbClr>
-                  </a:outerShdw>
-                </a:effectLst>
-                <a:latin typeface="+mn-lt"/>
-                <a:ea typeface="+mn-ea"/>
-                <a:cs typeface="+mn-cs"/>
-              </a:defRPr>
-            </a:lvl8pPr>
-            <a:lvl9pPr marL="3886200" indent="-228600" algn="l" defTabSz="457200" rtl="0" eaLnBrk="1" latinLnBrk="0" hangingPunct="1">
-              <a:spcBef>
-                <a:spcPct val="20000"/>
-              </a:spcBef>
-              <a:spcAft>
-                <a:spcPts val="600"/>
-              </a:spcAft>
-              <a:buClr>
-                <a:schemeClr val="accent1"/>
-              </a:buClr>
-              <a:buSzPct val="100000"/>
-              <a:buFont typeface="Arial"/>
-              <a:buChar char="•"/>
-              <a:defRPr sz="1200" kern="1200" cap="small">
-                <a:solidFill>
-                  <a:schemeClr val="tx1"/>
-                </a:solidFill>
-                <a:effectLst>
-                  <a:glow rad="38100">
-                    <a:schemeClr val="bg1">
-                      <a:lumMod val="50000"/>
-                      <a:lumOff val="50000"/>
-                      <a:alpha val="20000"/>
-                    </a:schemeClr>
-                  </a:glow>
-                  <a:outerShdw blurRad="44450" dist="12700" dir="13860000" algn="tl" rotWithShape="0">
-                    <a:srgbClr val="000000">
-                      <a:alpha val="20000"/>
-                    </a:srgbClr>
-                  </a:outerShdw>
-                </a:effectLst>
-                <a:latin typeface="+mn-lt"/>
-                <a:ea typeface="+mn-ea"/>
-                <a:cs typeface="+mn-cs"/>
-              </a:defRPr>
-            </a:lvl9pPr>
-          </a:lstStyle>
-          <a:p>
-            <a:pPr marL="0" indent="0">
-              <a:buFont typeface="Arial"/>
-              <a:buNone/>
-            </a:pPr>
-            <a:r>
-              <a:rPr lang="en-US" sz="1500" dirty="0"/>
-              <a:t>Insight:</a:t>
-            </a:r>
-          </a:p>
-          <a:p>
-            <a:r>
-              <a:rPr lang="en-US" sz="1500" dirty="0"/>
-              <a:t>Above data suggests less competition with better wages in Dallas over San Diego.</a:t>
-            </a:r>
-          </a:p>
-          <a:p>
-            <a:endParaRPr lang="en-US" dirty="0"/>
-          </a:p>
-        </p:txBody>
-      </p:sp>
-      <p:sp>
-        <p:nvSpPr>
-          <p:cNvPr id="17" name="TextBox 16">
-            <a:extLst>
-              <a:ext uri="{FF2B5EF4-FFF2-40B4-BE49-F238E27FC236}">
-                <a16:creationId xmlns:a16="http://schemas.microsoft.com/office/drawing/2014/main" id="{E4C72FDC-8A2E-524A-847E-28DC25695F20}"/>
+                <a16:creationId xmlns:a16="http://schemas.microsoft.com/office/drawing/2014/main" id="{217510DE-64A2-4C41-9B92-375416397A5A}"/>
               </a:ext>
             </a:extLst>
           </p:cNvPr>
@@ -8357,8 +7662,8 @@
         </p:nvSpPr>
         <p:spPr>
           <a:xfrm>
-            <a:off x="7405816" y="6414071"/>
-            <a:ext cx="4709984" cy="276999"/>
+            <a:off x="7467600" y="6414071"/>
+            <a:ext cx="4648200" cy="276999"/>
           </a:xfrm>
           <a:prstGeom prst="rect">
             <a:avLst/>
@@ -8377,16 +7682,46 @@
             </a:r>
             <a:r>
               <a:rPr lang="en-US" sz="1200" i="1" dirty="0" err="1"/>
-              <a:t>crashviewer.nhtsa.dot.gov</a:t>
+              <a:t>www.bls.gov</a:t>
             </a:r>
             <a:endParaRPr lang="en-US" sz="1200" i="1" dirty="0"/>
           </a:p>
         </p:txBody>
       </p:sp>
+      <p:pic>
+        <p:nvPicPr>
+          <p:cNvPr id="9" name="Picture 8" descr="A screenshot of a cell phone&#10;&#10;Description automatically generated">
+            <a:extLst>
+              <a:ext uri="{FF2B5EF4-FFF2-40B4-BE49-F238E27FC236}">
+                <a16:creationId xmlns:a16="http://schemas.microsoft.com/office/drawing/2014/main" id="{8E297B07-24A7-7C48-B203-BA3018F9A804}"/>
+              </a:ext>
+            </a:extLst>
+          </p:cNvPr>
+          <p:cNvPicPr>
+            <a:picLocks noChangeAspect="1"/>
+          </p:cNvPicPr>
+          <p:nvPr/>
+        </p:nvPicPr>
+        <p:blipFill>
+          <a:blip r:embed="rId3"/>
+          <a:stretch>
+            <a:fillRect/>
+          </a:stretch>
+        </p:blipFill>
+        <p:spPr>
+          <a:xfrm>
+            <a:off x="282053" y="1828800"/>
+            <a:ext cx="5486400" cy="3657600"/>
+          </a:xfrm>
+          <a:prstGeom prst="rect">
+            <a:avLst/>
+          </a:prstGeom>
+        </p:spPr>
+      </p:pic>
     </p:spTree>
     <p:extLst>
       <p:ext uri="{BB962C8B-B14F-4D97-AF65-F5344CB8AC3E}">
-        <p14:creationId xmlns:p14="http://schemas.microsoft.com/office/powerpoint/2010/main" val="3747629128"/>
+        <p14:creationId xmlns:p14="http://schemas.microsoft.com/office/powerpoint/2010/main" val="159405912"/>
       </p:ext>
     </p:extLst>
   </p:cSld>
@@ -8483,50 +7818,17 @@
                   </a:outerShdw>
                 </a:effectLst>
               </a:rPr>
-              <a:t>Safety</a:t>
-            </a:r>
-          </a:p>
-        </p:txBody>
-      </p:sp>
-      <p:pic>
-        <p:nvPicPr>
-          <p:cNvPr id="6" name="Content Placeholder 5">
+              <a:t>Employees  and wages</a:t>
+            </a:r>
+          </a:p>
+        </p:txBody>
+      </p:sp>
+      <p:sp>
+        <p:nvSpPr>
+          <p:cNvPr id="14" name="Content Placeholder 3">
             <a:extLst>
               <a:ext uri="{FF2B5EF4-FFF2-40B4-BE49-F238E27FC236}">
-                <a16:creationId xmlns:a16="http://schemas.microsoft.com/office/drawing/2014/main" id="{DED58C36-FC71-9F4D-9FFA-4198080B7393}"/>
-              </a:ext>
-            </a:extLst>
-          </p:cNvPr>
-          <p:cNvPicPr>
-            <a:picLocks noGrp="1" noChangeAspect="1"/>
-          </p:cNvPicPr>
-          <p:nvPr>
-            <p:ph sz="half" idx="2"/>
-          </p:nvPr>
-        </p:nvPicPr>
-        <p:blipFill>
-          <a:blip r:embed="rId3"/>
-          <a:stretch>
-            <a:fillRect/>
-          </a:stretch>
-        </p:blipFill>
-        <p:spPr>
-          <a:xfrm>
-            <a:off x="248757" y="419100"/>
-            <a:ext cx="5604927" cy="3362956"/>
-          </a:xfrm>
-          <a:prstGeom prst="rect">
-            <a:avLst/>
-          </a:prstGeom>
-          <a:effectLst/>
-        </p:spPr>
-      </p:pic>
-      <p:sp>
-        <p:nvSpPr>
-          <p:cNvPr id="7" name="Content Placeholder 3">
-            <a:extLst>
-              <a:ext uri="{FF2B5EF4-FFF2-40B4-BE49-F238E27FC236}">
-                <a16:creationId xmlns:a16="http://schemas.microsoft.com/office/drawing/2014/main" id="{CC4BAD22-965D-5F41-938A-9F60F12F6345}"/>
+                <a16:creationId xmlns:a16="http://schemas.microsoft.com/office/drawing/2014/main" id="{E2712C58-A5DC-DD40-B3DA-A2DA195624F9}"/>
               </a:ext>
             </a:extLst>
           </p:cNvPr>
@@ -8537,8 +7839,8 @@
         </p:nvSpPr>
         <p:spPr>
           <a:xfrm>
-            <a:off x="248757" y="5430071"/>
-            <a:ext cx="5604928" cy="945573"/>
+            <a:off x="700348" y="5430071"/>
+            <a:ext cx="5274425" cy="1066801"/>
           </a:xfrm>
           <a:prstGeom prst="rect">
             <a:avLst/>
@@ -8546,7 +7848,7 @@
         </p:spPr>
         <p:txBody>
           <a:bodyPr vert="horz" lIns="91440" tIns="45720" rIns="91440" bIns="45720" rtlCol="0" anchor="t">
-            <a:normAutofit fontScale="92500"/>
+            <a:normAutofit fontScale="47500" lnSpcReduction="20000"/>
           </a:bodyPr>
           <a:lstStyle>
             <a:lvl1pPr marL="285750" indent="-285750" algn="l" defTabSz="457200" rtl="0" eaLnBrk="1" latinLnBrk="0" hangingPunct="1">
@@ -8880,16 +8182,20 @@
               <a:buNone/>
             </a:pPr>
             <a:r>
-              <a:rPr lang="en-US" dirty="0"/>
-              <a:t>Question Asked:</a:t>
-            </a:r>
-          </a:p>
-          <a:p>
-            <a:r>
-              <a:rPr lang="en-US" sz="1700" dirty="0">
-                <a:effectLst/>
-              </a:rPr>
-              <a:t>How safe is it to drive a car in San Diego or Dallas?</a:t>
+              <a:rPr lang="en-US" sz="2900" dirty="0"/>
+              <a:t>Questions Asked:</a:t>
+            </a:r>
+          </a:p>
+          <a:p>
+            <a:r>
+              <a:rPr lang="en-US" sz="2900" dirty="0"/>
+              <a:t>How  many employees work for these establishments?</a:t>
+            </a:r>
+          </a:p>
+          <a:p>
+            <a:r>
+              <a:rPr lang="en-US" sz="2900" dirty="0"/>
+              <a:t>How much money can you make Annually?</a:t>
             </a:r>
           </a:p>
           <a:p>
@@ -8899,10 +8205,10 @@
       </p:sp>
       <p:sp>
         <p:nvSpPr>
-          <p:cNvPr id="8" name="Content Placeholder 3">
+          <p:cNvPr id="15" name="Content Placeholder 3">
             <a:extLst>
               <a:ext uri="{FF2B5EF4-FFF2-40B4-BE49-F238E27FC236}">
-                <a16:creationId xmlns:a16="http://schemas.microsoft.com/office/drawing/2014/main" id="{409994BD-6565-344A-9A17-0882F1CE1F67}"/>
+                <a16:creationId xmlns:a16="http://schemas.microsoft.com/office/drawing/2014/main" id="{EB6E3117-CF79-374A-91F5-BBF8FE64EB26}"/>
               </a:ext>
             </a:extLst>
           </p:cNvPr>
@@ -8913,8 +8219,8 @@
         </p:nvSpPr>
         <p:spPr>
           <a:xfrm>
-            <a:off x="6324563" y="5430071"/>
-            <a:ext cx="5604926" cy="945573"/>
+            <a:off x="6703859" y="5430072"/>
+            <a:ext cx="4787793" cy="945573"/>
           </a:xfrm>
           <a:prstGeom prst="rect">
             <a:avLst/>
@@ -8922,7 +8228,7 @@
         </p:spPr>
         <p:txBody>
           <a:bodyPr vert="horz" lIns="91440" tIns="45720" rIns="91440" bIns="45720" rtlCol="0" anchor="t">
-            <a:normAutofit fontScale="92500" lnSpcReduction="20000"/>
+            <a:normAutofit lnSpcReduction="10000"/>
           </a:bodyPr>
           <a:lstStyle>
             <a:lvl1pPr marL="285750" indent="-285750" algn="l" defTabSz="457200" rtl="0" eaLnBrk="1" latinLnBrk="0" hangingPunct="1">
@@ -9256,14 +8562,14 @@
               <a:buNone/>
             </a:pPr>
             <a:r>
-              <a:rPr lang="en-US" dirty="0"/>
+              <a:rPr lang="en-US" sz="1500" dirty="0"/>
               <a:t>Insight:</a:t>
             </a:r>
           </a:p>
           <a:p>
             <a:r>
-              <a:rPr lang="en-US" sz="1700" dirty="0"/>
-              <a:t>The number of Accidents with fatalities is trending upwards in Dallas, while San Diego’s trend is neutral.</a:t>
+              <a:rPr lang="en-US" sz="1500" dirty="0"/>
+              <a:t>Above data suggests less competition with better wages in Dallas over San Diego.</a:t>
             </a:r>
           </a:p>
           <a:p>
@@ -9273,10 +8579,10 @@
       </p:sp>
       <p:sp>
         <p:nvSpPr>
-          <p:cNvPr id="10" name="TextBox 9">
+          <p:cNvPr id="17" name="TextBox 16">
             <a:extLst>
               <a:ext uri="{FF2B5EF4-FFF2-40B4-BE49-F238E27FC236}">
-                <a16:creationId xmlns:a16="http://schemas.microsoft.com/office/drawing/2014/main" id="{940778FD-6E87-FD43-B986-32F8D66F54C6}"/>
+                <a16:creationId xmlns:a16="http://schemas.microsoft.com/office/drawing/2014/main" id="{E4C72FDC-8A2E-524A-847E-28DC25695F20}"/>
               </a:ext>
             </a:extLst>
           </p:cNvPr>
@@ -9313,10 +8619,37 @@
       </p:sp>
       <p:pic>
         <p:nvPicPr>
-          <p:cNvPr id="9" name="Picture 8" descr="A screenshot of a cell phone&#10;&#10;Description automatically generated">
+          <p:cNvPr id="12" name="Picture 11">
             <a:extLst>
               <a:ext uri="{FF2B5EF4-FFF2-40B4-BE49-F238E27FC236}">
-                <a16:creationId xmlns:a16="http://schemas.microsoft.com/office/drawing/2014/main" id="{63CC8A3F-1C5F-E44C-86A3-94EF403A4FC0}"/>
+                <a16:creationId xmlns:a16="http://schemas.microsoft.com/office/drawing/2014/main" id="{FCF82165-671C-734F-85BD-DB7D447C4F38}"/>
+              </a:ext>
+            </a:extLst>
+          </p:cNvPr>
+          <p:cNvPicPr/>
+          <p:nvPr/>
+        </p:nvPicPr>
+        <p:blipFill rotWithShape="1">
+          <a:blip r:embed="rId3"/>
+          <a:srcRect t="-30" r="8940" b="5719"/>
+          <a:stretch/>
+        </p:blipFill>
+        <p:spPr>
+          <a:xfrm>
+            <a:off x="236562" y="748444"/>
+            <a:ext cx="5513832" cy="3657600"/>
+          </a:xfrm>
+          <a:prstGeom prst="rect">
+            <a:avLst/>
+          </a:prstGeom>
+        </p:spPr>
+      </p:pic>
+      <p:pic>
+        <p:nvPicPr>
+          <p:cNvPr id="13" name="Picture 12" descr="A screenshot of a cell phone&#10;&#10;Description automatically generated">
+            <a:extLst>
+              <a:ext uri="{FF2B5EF4-FFF2-40B4-BE49-F238E27FC236}">
+                <a16:creationId xmlns:a16="http://schemas.microsoft.com/office/drawing/2014/main" id="{5027132A-7C90-CF4A-BB89-85D237742626}"/>
               </a:ext>
             </a:extLst>
           </p:cNvPr>
@@ -9325,16 +8658,15 @@
           </p:cNvPicPr>
           <p:nvPr/>
         </p:nvPicPr>
-        <p:blipFill>
+        <p:blipFill rotWithShape="1">
           <a:blip r:embed="rId4"/>
-          <a:stretch>
-            <a:fillRect/>
-          </a:stretch>
+          <a:srcRect l="4042" t="4479"/>
+          <a:stretch/>
         </p:blipFill>
         <p:spPr>
           <a:xfrm>
-            <a:off x="6343576" y="419100"/>
-            <a:ext cx="5604926" cy="3362956"/>
+            <a:off x="6442363" y="749507"/>
+            <a:ext cx="5513073" cy="3658663"/>
           </a:xfrm>
           <a:prstGeom prst="rect">
             <a:avLst/>
@@ -9344,7 +8676,7 @@
     </p:spTree>
     <p:extLst>
       <p:ext uri="{BB962C8B-B14F-4D97-AF65-F5344CB8AC3E}">
-        <p14:creationId xmlns:p14="http://schemas.microsoft.com/office/powerpoint/2010/main" val="1595918270"/>
+        <p14:creationId xmlns:p14="http://schemas.microsoft.com/office/powerpoint/2010/main" val="3747629128"/>
       </p:ext>
     </p:extLst>
   </p:cSld>
@@ -9400,7 +8732,7 @@
           <p:cNvPr id="2" name="Title 1">
             <a:extLst>
               <a:ext uri="{FF2B5EF4-FFF2-40B4-BE49-F238E27FC236}">
-                <a16:creationId xmlns:a16="http://schemas.microsoft.com/office/drawing/2014/main" id="{12DF547D-2983-8A4B-BA4B-0188AFAACBA7}"/>
+                <a16:creationId xmlns:a16="http://schemas.microsoft.com/office/drawing/2014/main" id="{D1C2A00E-7D49-6B47-B595-C08AE0AE6343}"/>
               </a:ext>
             </a:extLst>
           </p:cNvPr>
@@ -9413,83 +8745,803 @@
         </p:nvSpPr>
         <p:spPr>
           <a:xfrm>
-            <a:off x="7467600" y="914400"/>
-            <a:ext cx="5122606" cy="914400"/>
+            <a:off x="988630" y="4363271"/>
+            <a:ext cx="10200986" cy="1066801"/>
           </a:xfrm>
         </p:spPr>
         <p:txBody>
-          <a:bodyPr vert="horz" lIns="91440" tIns="45720" rIns="91440" bIns="45720" rtlCol="0" anchor="ctr">
+          <a:bodyPr vert="horz" lIns="91440" tIns="45720" rIns="91440" bIns="45720" rtlCol="0" anchor="b">
             <a:normAutofit/>
           </a:bodyPr>
           <a:lstStyle/>
           <a:p>
-            <a:r>
-              <a:rPr lang="en-US" dirty="0"/>
-              <a:t>New York Taxis  </a:t>
-            </a:r>
-          </a:p>
-        </p:txBody>
-      </p:sp>
-      <p:sp>
-        <p:nvSpPr>
-          <p:cNvPr id="13" name="Content Placeholder 3">
+            <a:pPr algn="ctr"/>
+            <a:r>
+              <a:rPr lang="en-US" sz="4800" dirty="0">
+                <a:effectLst>
+                  <a:glow rad="38100">
+                    <a:schemeClr val="bg1">
+                      <a:lumMod val="65000"/>
+                      <a:lumOff val="35000"/>
+                      <a:alpha val="50000"/>
+                    </a:schemeClr>
+                  </a:glow>
+                  <a:outerShdw blurRad="28575" dist="31750" dir="13200000" algn="tl" rotWithShape="0">
+                    <a:srgbClr val="000000">
+                      <a:alpha val="25000"/>
+                    </a:srgbClr>
+                  </a:outerShdw>
+                </a:effectLst>
+              </a:rPr>
+              <a:t>Safety</a:t>
+            </a:r>
+          </a:p>
+        </p:txBody>
+      </p:sp>
+      <p:pic>
+        <p:nvPicPr>
+          <p:cNvPr id="6" name="Content Placeholder 5">
             <a:extLst>
               <a:ext uri="{FF2B5EF4-FFF2-40B4-BE49-F238E27FC236}">
-                <a16:creationId xmlns:a16="http://schemas.microsoft.com/office/drawing/2014/main" id="{2C335AAF-A1D5-A643-AB88-C93D00C1815D}"/>
+                <a16:creationId xmlns:a16="http://schemas.microsoft.com/office/drawing/2014/main" id="{DED58C36-FC71-9F4D-9FFA-4198080B7393}"/>
               </a:ext>
             </a:extLst>
           </p:cNvPr>
-          <p:cNvSpPr>
-            <a:spLocks noGrp="1"/>
-          </p:cNvSpPr>
-          <p:nvPr>
-            <p:ph sz="half" idx="1"/>
-          </p:nvPr>
-        </p:nvSpPr>
+          <p:cNvPicPr>
+            <a:picLocks noGrp="1" noChangeAspect="1"/>
+          </p:cNvPicPr>
+          <p:nvPr>
+            <p:ph sz="half" idx="2"/>
+          </p:nvPr>
+        </p:nvPicPr>
+        <p:blipFill>
+          <a:blip r:embed="rId3"/>
+          <a:stretch>
+            <a:fillRect/>
+          </a:stretch>
+        </p:blipFill>
         <p:spPr>
           <a:xfrm>
-            <a:off x="7467600" y="1828800"/>
-            <a:ext cx="4709984" cy="4572000"/>
+            <a:off x="248757" y="419100"/>
+            <a:ext cx="5604927" cy="3362956"/>
           </a:xfrm>
+          <a:prstGeom prst="rect">
+            <a:avLst/>
+          </a:prstGeom>
         </p:spPr>
+      </p:pic>
+      <p:sp>
+        <p:nvSpPr>
+          <p:cNvPr id="7" name="Content Placeholder 3">
+            <a:extLst>
+              <a:ext uri="{FF2B5EF4-FFF2-40B4-BE49-F238E27FC236}">
+                <a16:creationId xmlns:a16="http://schemas.microsoft.com/office/drawing/2014/main" id="{CC4BAD22-965D-5F41-938A-9F60F12F6345}"/>
+              </a:ext>
+            </a:extLst>
+          </p:cNvPr>
+          <p:cNvSpPr txBox="1">
+            <a:spLocks/>
+          </p:cNvSpPr>
+          <p:nvPr/>
+        </p:nvSpPr>
+        <p:spPr>
+          <a:xfrm>
+            <a:off x="248757" y="5430071"/>
+            <a:ext cx="5604928" cy="945573"/>
+          </a:xfrm>
+          <a:prstGeom prst="rect">
+            <a:avLst/>
+          </a:prstGeom>
+        </p:spPr>
         <p:txBody>
           <a:bodyPr vert="horz" lIns="91440" tIns="45720" rIns="91440" bIns="45720" rtlCol="0" anchor="t">
-            <a:normAutofit/>
+            <a:normAutofit fontScale="92500"/>
           </a:bodyPr>
-          <a:lstStyle/>
+          <a:lstStyle>
+            <a:lvl1pPr marL="285750" indent="-285750" algn="l" defTabSz="457200" rtl="0" eaLnBrk="1" latinLnBrk="0" hangingPunct="1">
+              <a:spcBef>
+                <a:spcPct val="20000"/>
+              </a:spcBef>
+              <a:spcAft>
+                <a:spcPts val="600"/>
+              </a:spcAft>
+              <a:buClr>
+                <a:schemeClr val="accent1"/>
+              </a:buClr>
+              <a:buSzPct val="100000"/>
+              <a:buFont typeface="Arial"/>
+              <a:buChar char="•"/>
+              <a:defRPr sz="1800" kern="1200" cap="small">
+                <a:solidFill>
+                  <a:schemeClr val="tx1"/>
+                </a:solidFill>
+                <a:effectLst>
+                  <a:glow rad="38100">
+                    <a:schemeClr val="bg1">
+                      <a:lumMod val="50000"/>
+                      <a:lumOff val="50000"/>
+                      <a:alpha val="20000"/>
+                    </a:schemeClr>
+                  </a:glow>
+                  <a:outerShdw blurRad="44450" dist="12700" dir="13860000" algn="tl" rotWithShape="0">
+                    <a:srgbClr val="000000">
+                      <a:alpha val="20000"/>
+                    </a:srgbClr>
+                  </a:outerShdw>
+                </a:effectLst>
+                <a:latin typeface="+mn-lt"/>
+                <a:ea typeface="+mn-ea"/>
+                <a:cs typeface="+mn-cs"/>
+              </a:defRPr>
+            </a:lvl1pPr>
+            <a:lvl2pPr marL="742950" indent="-285750" algn="l" defTabSz="457200" rtl="0" eaLnBrk="1" latinLnBrk="0" hangingPunct="1">
+              <a:spcBef>
+                <a:spcPct val="20000"/>
+              </a:spcBef>
+              <a:spcAft>
+                <a:spcPts val="600"/>
+              </a:spcAft>
+              <a:buClr>
+                <a:schemeClr val="accent1"/>
+              </a:buClr>
+              <a:buSzPct val="100000"/>
+              <a:buFont typeface="Arial"/>
+              <a:buChar char="•"/>
+              <a:defRPr sz="1600" kern="1200" cap="small">
+                <a:solidFill>
+                  <a:schemeClr val="tx1"/>
+                </a:solidFill>
+                <a:effectLst>
+                  <a:glow rad="38100">
+                    <a:schemeClr val="bg1">
+                      <a:lumMod val="50000"/>
+                      <a:lumOff val="50000"/>
+                      <a:alpha val="20000"/>
+                    </a:schemeClr>
+                  </a:glow>
+                  <a:outerShdw blurRad="44450" dist="12700" dir="13860000" algn="tl" rotWithShape="0">
+                    <a:srgbClr val="000000">
+                      <a:alpha val="20000"/>
+                    </a:srgbClr>
+                  </a:outerShdw>
+                </a:effectLst>
+                <a:latin typeface="+mn-lt"/>
+                <a:ea typeface="+mn-ea"/>
+                <a:cs typeface="+mn-cs"/>
+              </a:defRPr>
+            </a:lvl2pPr>
+            <a:lvl3pPr marL="1200150" indent="-285750" algn="l" defTabSz="457200" rtl="0" eaLnBrk="1" latinLnBrk="0" hangingPunct="1">
+              <a:spcBef>
+                <a:spcPct val="20000"/>
+              </a:spcBef>
+              <a:spcAft>
+                <a:spcPts val="600"/>
+              </a:spcAft>
+              <a:buClr>
+                <a:schemeClr val="accent1"/>
+              </a:buClr>
+              <a:buSzPct val="100000"/>
+              <a:buFont typeface="Arial"/>
+              <a:buChar char="•"/>
+              <a:defRPr sz="1400" kern="1200" cap="small">
+                <a:solidFill>
+                  <a:schemeClr val="tx1"/>
+                </a:solidFill>
+                <a:effectLst>
+                  <a:glow rad="38100">
+                    <a:schemeClr val="bg1">
+                      <a:lumMod val="50000"/>
+                      <a:lumOff val="50000"/>
+                      <a:alpha val="20000"/>
+                    </a:schemeClr>
+                  </a:glow>
+                  <a:outerShdw blurRad="44450" dist="12700" dir="13860000" algn="tl" rotWithShape="0">
+                    <a:srgbClr val="000000">
+                      <a:alpha val="20000"/>
+                    </a:srgbClr>
+                  </a:outerShdw>
+                </a:effectLst>
+                <a:latin typeface="+mn-lt"/>
+                <a:ea typeface="+mn-ea"/>
+                <a:cs typeface="+mn-cs"/>
+              </a:defRPr>
+            </a:lvl3pPr>
+            <a:lvl4pPr marL="1543050" indent="-171450" algn="l" defTabSz="457200" rtl="0" eaLnBrk="1" latinLnBrk="0" hangingPunct="1">
+              <a:spcBef>
+                <a:spcPct val="20000"/>
+              </a:spcBef>
+              <a:spcAft>
+                <a:spcPts val="600"/>
+              </a:spcAft>
+              <a:buClr>
+                <a:schemeClr val="accent1"/>
+              </a:buClr>
+              <a:buSzPct val="100000"/>
+              <a:buFont typeface="Arial"/>
+              <a:buChar char="•"/>
+              <a:defRPr sz="1200" kern="1200" cap="small">
+                <a:solidFill>
+                  <a:schemeClr val="tx1"/>
+                </a:solidFill>
+                <a:effectLst>
+                  <a:glow rad="38100">
+                    <a:schemeClr val="bg1">
+                      <a:lumMod val="50000"/>
+                      <a:lumOff val="50000"/>
+                      <a:alpha val="20000"/>
+                    </a:schemeClr>
+                  </a:glow>
+                  <a:outerShdw blurRad="44450" dist="12700" dir="13860000" algn="tl" rotWithShape="0">
+                    <a:srgbClr val="000000">
+                      <a:alpha val="20000"/>
+                    </a:srgbClr>
+                  </a:outerShdw>
+                </a:effectLst>
+                <a:latin typeface="+mn-lt"/>
+                <a:ea typeface="+mn-ea"/>
+                <a:cs typeface="+mn-cs"/>
+              </a:defRPr>
+            </a:lvl4pPr>
+            <a:lvl5pPr marL="2000250" indent="-171450" algn="l" defTabSz="457200" rtl="0" eaLnBrk="1" latinLnBrk="0" hangingPunct="1">
+              <a:spcBef>
+                <a:spcPct val="20000"/>
+              </a:spcBef>
+              <a:spcAft>
+                <a:spcPts val="600"/>
+              </a:spcAft>
+              <a:buClr>
+                <a:schemeClr val="accent1"/>
+              </a:buClr>
+              <a:buSzPct val="100000"/>
+              <a:buFont typeface="Arial"/>
+              <a:buChar char="•"/>
+              <a:defRPr sz="1200" kern="1200" cap="small">
+                <a:solidFill>
+                  <a:schemeClr val="tx1"/>
+                </a:solidFill>
+                <a:effectLst>
+                  <a:glow rad="38100">
+                    <a:schemeClr val="bg1">
+                      <a:lumMod val="50000"/>
+                      <a:lumOff val="50000"/>
+                      <a:alpha val="20000"/>
+                    </a:schemeClr>
+                  </a:glow>
+                  <a:outerShdw blurRad="44450" dist="12700" dir="13860000" algn="tl" rotWithShape="0">
+                    <a:srgbClr val="000000">
+                      <a:alpha val="20000"/>
+                    </a:srgbClr>
+                  </a:outerShdw>
+                </a:effectLst>
+                <a:latin typeface="+mn-lt"/>
+                <a:ea typeface="+mn-ea"/>
+                <a:cs typeface="+mn-cs"/>
+              </a:defRPr>
+            </a:lvl5pPr>
+            <a:lvl6pPr marL="2514600" indent="-228600" algn="l" defTabSz="457200" rtl="0" eaLnBrk="1" latinLnBrk="0" hangingPunct="1">
+              <a:spcBef>
+                <a:spcPct val="20000"/>
+              </a:spcBef>
+              <a:spcAft>
+                <a:spcPts val="600"/>
+              </a:spcAft>
+              <a:buClr>
+                <a:schemeClr val="accent1"/>
+              </a:buClr>
+              <a:buSzPct val="100000"/>
+              <a:buFont typeface="Arial"/>
+              <a:buChar char="•"/>
+              <a:defRPr sz="1200" kern="1200" cap="small">
+                <a:solidFill>
+                  <a:schemeClr val="tx1"/>
+                </a:solidFill>
+                <a:effectLst>
+                  <a:glow rad="38100">
+                    <a:schemeClr val="bg1">
+                      <a:lumMod val="50000"/>
+                      <a:lumOff val="50000"/>
+                      <a:alpha val="20000"/>
+                    </a:schemeClr>
+                  </a:glow>
+                  <a:outerShdw blurRad="44450" dist="12700" dir="13860000" algn="tl" rotWithShape="0">
+                    <a:srgbClr val="000000">
+                      <a:alpha val="20000"/>
+                    </a:srgbClr>
+                  </a:outerShdw>
+                </a:effectLst>
+                <a:latin typeface="+mn-lt"/>
+                <a:ea typeface="+mn-ea"/>
+                <a:cs typeface="+mn-cs"/>
+              </a:defRPr>
+            </a:lvl6pPr>
+            <a:lvl7pPr marL="2971800" indent="-228600" algn="l" defTabSz="457200" rtl="0" eaLnBrk="1" latinLnBrk="0" hangingPunct="1">
+              <a:spcBef>
+                <a:spcPct val="20000"/>
+              </a:spcBef>
+              <a:spcAft>
+                <a:spcPts val="600"/>
+              </a:spcAft>
+              <a:buClr>
+                <a:schemeClr val="accent1"/>
+              </a:buClr>
+              <a:buSzPct val="100000"/>
+              <a:buFont typeface="Arial"/>
+              <a:buChar char="•"/>
+              <a:defRPr sz="1200" kern="1200" cap="small">
+                <a:solidFill>
+                  <a:schemeClr val="tx1"/>
+                </a:solidFill>
+                <a:effectLst>
+                  <a:glow rad="38100">
+                    <a:schemeClr val="bg1">
+                      <a:lumMod val="50000"/>
+                      <a:lumOff val="50000"/>
+                      <a:alpha val="20000"/>
+                    </a:schemeClr>
+                  </a:glow>
+                  <a:outerShdw blurRad="44450" dist="12700" dir="13860000" algn="tl" rotWithShape="0">
+                    <a:srgbClr val="000000">
+                      <a:alpha val="20000"/>
+                    </a:srgbClr>
+                  </a:outerShdw>
+                </a:effectLst>
+                <a:latin typeface="+mn-lt"/>
+                <a:ea typeface="+mn-ea"/>
+                <a:cs typeface="+mn-cs"/>
+              </a:defRPr>
+            </a:lvl7pPr>
+            <a:lvl8pPr marL="3429000" indent="-228600" algn="l" defTabSz="457200" rtl="0" eaLnBrk="1" latinLnBrk="0" hangingPunct="1">
+              <a:spcBef>
+                <a:spcPct val="20000"/>
+              </a:spcBef>
+              <a:spcAft>
+                <a:spcPts val="600"/>
+              </a:spcAft>
+              <a:buClr>
+                <a:schemeClr val="accent1"/>
+              </a:buClr>
+              <a:buSzPct val="100000"/>
+              <a:buFont typeface="Arial"/>
+              <a:buChar char="•"/>
+              <a:defRPr sz="1200" kern="1200" cap="small">
+                <a:solidFill>
+                  <a:schemeClr val="tx1"/>
+                </a:solidFill>
+                <a:effectLst>
+                  <a:glow rad="38100">
+                    <a:schemeClr val="bg1">
+                      <a:lumMod val="50000"/>
+                      <a:lumOff val="50000"/>
+                      <a:alpha val="20000"/>
+                    </a:schemeClr>
+                  </a:glow>
+                  <a:outerShdw blurRad="44450" dist="12700" dir="13860000" algn="tl" rotWithShape="0">
+                    <a:srgbClr val="000000">
+                      <a:alpha val="20000"/>
+                    </a:srgbClr>
+                  </a:outerShdw>
+                </a:effectLst>
+                <a:latin typeface="+mn-lt"/>
+                <a:ea typeface="+mn-ea"/>
+                <a:cs typeface="+mn-cs"/>
+              </a:defRPr>
+            </a:lvl8pPr>
+            <a:lvl9pPr marL="3886200" indent="-228600" algn="l" defTabSz="457200" rtl="0" eaLnBrk="1" latinLnBrk="0" hangingPunct="1">
+              <a:spcBef>
+                <a:spcPct val="20000"/>
+              </a:spcBef>
+              <a:spcAft>
+                <a:spcPts val="600"/>
+              </a:spcAft>
+              <a:buClr>
+                <a:schemeClr val="accent1"/>
+              </a:buClr>
+              <a:buSzPct val="100000"/>
+              <a:buFont typeface="Arial"/>
+              <a:buChar char="•"/>
+              <a:defRPr sz="1200" kern="1200" cap="small">
+                <a:solidFill>
+                  <a:schemeClr val="tx1"/>
+                </a:solidFill>
+                <a:effectLst>
+                  <a:glow rad="38100">
+                    <a:schemeClr val="bg1">
+                      <a:lumMod val="50000"/>
+                      <a:lumOff val="50000"/>
+                      <a:alpha val="20000"/>
+                    </a:schemeClr>
+                  </a:glow>
+                  <a:outerShdw blurRad="44450" dist="12700" dir="13860000" algn="tl" rotWithShape="0">
+                    <a:srgbClr val="000000">
+                      <a:alpha val="20000"/>
+                    </a:srgbClr>
+                  </a:outerShdw>
+                </a:effectLst>
+                <a:latin typeface="+mn-lt"/>
+                <a:ea typeface="+mn-ea"/>
+                <a:cs typeface="+mn-cs"/>
+              </a:defRPr>
+            </a:lvl9pPr>
+          </a:lstStyle>
           <a:p>
             <a:pPr marL="0" indent="0">
+              <a:buFont typeface="Arial"/>
               <a:buNone/>
             </a:pPr>
             <a:r>
               <a:rPr lang="en-US" dirty="0"/>
-              <a:t>Questions Asked:</a:t>
-            </a:r>
-          </a:p>
-          <a:p>
-            <a:r>
-              <a:rPr lang="en-US" dirty="0">
+              <a:t>Question Asked:</a:t>
+            </a:r>
+          </a:p>
+          <a:p>
+            <a:r>
+              <a:rPr lang="en-US" sz="1700" dirty="0">
                 <a:effectLst/>
               </a:rPr>
-              <a:t>Why did we include this slide / data?</a:t>
-            </a:r>
-          </a:p>
-          <a:p>
-            <a:r>
-              <a:rPr lang="en-US" dirty="0">
-                <a:effectLst/>
-              </a:rPr>
-              <a:t>What does the data show on taxi usage?</a:t>
-            </a:r>
-          </a:p>
+              <a:t>How safe is it to drive a car in San Diego or Dallas?</a:t>
+            </a:r>
+          </a:p>
+          <a:p>
+            <a:endParaRPr lang="en-US" dirty="0"/>
+          </a:p>
+        </p:txBody>
+      </p:sp>
+      <p:sp>
+        <p:nvSpPr>
+          <p:cNvPr id="8" name="Content Placeholder 3">
+            <a:extLst>
+              <a:ext uri="{FF2B5EF4-FFF2-40B4-BE49-F238E27FC236}">
+                <a16:creationId xmlns:a16="http://schemas.microsoft.com/office/drawing/2014/main" id="{409994BD-6565-344A-9A17-0882F1CE1F67}"/>
+              </a:ext>
+            </a:extLst>
+          </p:cNvPr>
+          <p:cNvSpPr txBox="1">
+            <a:spLocks/>
+          </p:cNvSpPr>
+          <p:nvPr/>
+        </p:nvSpPr>
+        <p:spPr>
+          <a:xfrm>
+            <a:off x="6324563" y="5430071"/>
+            <a:ext cx="5604926" cy="945573"/>
+          </a:xfrm>
+          <a:prstGeom prst="rect">
+            <a:avLst/>
+          </a:prstGeom>
+        </p:spPr>
+        <p:txBody>
+          <a:bodyPr vert="horz" lIns="91440" tIns="45720" rIns="91440" bIns="45720" rtlCol="0" anchor="t">
+            <a:normAutofit fontScale="92500" lnSpcReduction="20000"/>
+          </a:bodyPr>
+          <a:lstStyle>
+            <a:lvl1pPr marL="285750" indent="-285750" algn="l" defTabSz="457200" rtl="0" eaLnBrk="1" latinLnBrk="0" hangingPunct="1">
+              <a:spcBef>
+                <a:spcPct val="20000"/>
+              </a:spcBef>
+              <a:spcAft>
+                <a:spcPts val="600"/>
+              </a:spcAft>
+              <a:buClr>
+                <a:schemeClr val="accent1"/>
+              </a:buClr>
+              <a:buSzPct val="100000"/>
+              <a:buFont typeface="Arial"/>
+              <a:buChar char="•"/>
+              <a:defRPr sz="1800" kern="1200" cap="small">
+                <a:solidFill>
+                  <a:schemeClr val="tx1"/>
+                </a:solidFill>
+                <a:effectLst>
+                  <a:glow rad="38100">
+                    <a:schemeClr val="bg1">
+                      <a:lumMod val="50000"/>
+                      <a:lumOff val="50000"/>
+                      <a:alpha val="20000"/>
+                    </a:schemeClr>
+                  </a:glow>
+                  <a:outerShdw blurRad="44450" dist="12700" dir="13860000" algn="tl" rotWithShape="0">
+                    <a:srgbClr val="000000">
+                      <a:alpha val="20000"/>
+                    </a:srgbClr>
+                  </a:outerShdw>
+                </a:effectLst>
+                <a:latin typeface="+mn-lt"/>
+                <a:ea typeface="+mn-ea"/>
+                <a:cs typeface="+mn-cs"/>
+              </a:defRPr>
+            </a:lvl1pPr>
+            <a:lvl2pPr marL="742950" indent="-285750" algn="l" defTabSz="457200" rtl="0" eaLnBrk="1" latinLnBrk="0" hangingPunct="1">
+              <a:spcBef>
+                <a:spcPct val="20000"/>
+              </a:spcBef>
+              <a:spcAft>
+                <a:spcPts val="600"/>
+              </a:spcAft>
+              <a:buClr>
+                <a:schemeClr val="accent1"/>
+              </a:buClr>
+              <a:buSzPct val="100000"/>
+              <a:buFont typeface="Arial"/>
+              <a:buChar char="•"/>
+              <a:defRPr sz="1600" kern="1200" cap="small">
+                <a:solidFill>
+                  <a:schemeClr val="tx1"/>
+                </a:solidFill>
+                <a:effectLst>
+                  <a:glow rad="38100">
+                    <a:schemeClr val="bg1">
+                      <a:lumMod val="50000"/>
+                      <a:lumOff val="50000"/>
+                      <a:alpha val="20000"/>
+                    </a:schemeClr>
+                  </a:glow>
+                  <a:outerShdw blurRad="44450" dist="12700" dir="13860000" algn="tl" rotWithShape="0">
+                    <a:srgbClr val="000000">
+                      <a:alpha val="20000"/>
+                    </a:srgbClr>
+                  </a:outerShdw>
+                </a:effectLst>
+                <a:latin typeface="+mn-lt"/>
+                <a:ea typeface="+mn-ea"/>
+                <a:cs typeface="+mn-cs"/>
+              </a:defRPr>
+            </a:lvl2pPr>
+            <a:lvl3pPr marL="1200150" indent="-285750" algn="l" defTabSz="457200" rtl="0" eaLnBrk="1" latinLnBrk="0" hangingPunct="1">
+              <a:spcBef>
+                <a:spcPct val="20000"/>
+              </a:spcBef>
+              <a:spcAft>
+                <a:spcPts val="600"/>
+              </a:spcAft>
+              <a:buClr>
+                <a:schemeClr val="accent1"/>
+              </a:buClr>
+              <a:buSzPct val="100000"/>
+              <a:buFont typeface="Arial"/>
+              <a:buChar char="•"/>
+              <a:defRPr sz="1400" kern="1200" cap="small">
+                <a:solidFill>
+                  <a:schemeClr val="tx1"/>
+                </a:solidFill>
+                <a:effectLst>
+                  <a:glow rad="38100">
+                    <a:schemeClr val="bg1">
+                      <a:lumMod val="50000"/>
+                      <a:lumOff val="50000"/>
+                      <a:alpha val="20000"/>
+                    </a:schemeClr>
+                  </a:glow>
+                  <a:outerShdw blurRad="44450" dist="12700" dir="13860000" algn="tl" rotWithShape="0">
+                    <a:srgbClr val="000000">
+                      <a:alpha val="20000"/>
+                    </a:srgbClr>
+                  </a:outerShdw>
+                </a:effectLst>
+                <a:latin typeface="+mn-lt"/>
+                <a:ea typeface="+mn-ea"/>
+                <a:cs typeface="+mn-cs"/>
+              </a:defRPr>
+            </a:lvl3pPr>
+            <a:lvl4pPr marL="1543050" indent="-171450" algn="l" defTabSz="457200" rtl="0" eaLnBrk="1" latinLnBrk="0" hangingPunct="1">
+              <a:spcBef>
+                <a:spcPct val="20000"/>
+              </a:spcBef>
+              <a:spcAft>
+                <a:spcPts val="600"/>
+              </a:spcAft>
+              <a:buClr>
+                <a:schemeClr val="accent1"/>
+              </a:buClr>
+              <a:buSzPct val="100000"/>
+              <a:buFont typeface="Arial"/>
+              <a:buChar char="•"/>
+              <a:defRPr sz="1200" kern="1200" cap="small">
+                <a:solidFill>
+                  <a:schemeClr val="tx1"/>
+                </a:solidFill>
+                <a:effectLst>
+                  <a:glow rad="38100">
+                    <a:schemeClr val="bg1">
+                      <a:lumMod val="50000"/>
+                      <a:lumOff val="50000"/>
+                      <a:alpha val="20000"/>
+                    </a:schemeClr>
+                  </a:glow>
+                  <a:outerShdw blurRad="44450" dist="12700" dir="13860000" algn="tl" rotWithShape="0">
+                    <a:srgbClr val="000000">
+                      <a:alpha val="20000"/>
+                    </a:srgbClr>
+                  </a:outerShdw>
+                </a:effectLst>
+                <a:latin typeface="+mn-lt"/>
+                <a:ea typeface="+mn-ea"/>
+                <a:cs typeface="+mn-cs"/>
+              </a:defRPr>
+            </a:lvl4pPr>
+            <a:lvl5pPr marL="2000250" indent="-171450" algn="l" defTabSz="457200" rtl="0" eaLnBrk="1" latinLnBrk="0" hangingPunct="1">
+              <a:spcBef>
+                <a:spcPct val="20000"/>
+              </a:spcBef>
+              <a:spcAft>
+                <a:spcPts val="600"/>
+              </a:spcAft>
+              <a:buClr>
+                <a:schemeClr val="accent1"/>
+              </a:buClr>
+              <a:buSzPct val="100000"/>
+              <a:buFont typeface="Arial"/>
+              <a:buChar char="•"/>
+              <a:defRPr sz="1200" kern="1200" cap="small">
+                <a:solidFill>
+                  <a:schemeClr val="tx1"/>
+                </a:solidFill>
+                <a:effectLst>
+                  <a:glow rad="38100">
+                    <a:schemeClr val="bg1">
+                      <a:lumMod val="50000"/>
+                      <a:lumOff val="50000"/>
+                      <a:alpha val="20000"/>
+                    </a:schemeClr>
+                  </a:glow>
+                  <a:outerShdw blurRad="44450" dist="12700" dir="13860000" algn="tl" rotWithShape="0">
+                    <a:srgbClr val="000000">
+                      <a:alpha val="20000"/>
+                    </a:srgbClr>
+                  </a:outerShdw>
+                </a:effectLst>
+                <a:latin typeface="+mn-lt"/>
+                <a:ea typeface="+mn-ea"/>
+                <a:cs typeface="+mn-cs"/>
+              </a:defRPr>
+            </a:lvl5pPr>
+            <a:lvl6pPr marL="2514600" indent="-228600" algn="l" defTabSz="457200" rtl="0" eaLnBrk="1" latinLnBrk="0" hangingPunct="1">
+              <a:spcBef>
+                <a:spcPct val="20000"/>
+              </a:spcBef>
+              <a:spcAft>
+                <a:spcPts val="600"/>
+              </a:spcAft>
+              <a:buClr>
+                <a:schemeClr val="accent1"/>
+              </a:buClr>
+              <a:buSzPct val="100000"/>
+              <a:buFont typeface="Arial"/>
+              <a:buChar char="•"/>
+              <a:defRPr sz="1200" kern="1200" cap="small">
+                <a:solidFill>
+                  <a:schemeClr val="tx1"/>
+                </a:solidFill>
+                <a:effectLst>
+                  <a:glow rad="38100">
+                    <a:schemeClr val="bg1">
+                      <a:lumMod val="50000"/>
+                      <a:lumOff val="50000"/>
+                      <a:alpha val="20000"/>
+                    </a:schemeClr>
+                  </a:glow>
+                  <a:outerShdw blurRad="44450" dist="12700" dir="13860000" algn="tl" rotWithShape="0">
+                    <a:srgbClr val="000000">
+                      <a:alpha val="20000"/>
+                    </a:srgbClr>
+                  </a:outerShdw>
+                </a:effectLst>
+                <a:latin typeface="+mn-lt"/>
+                <a:ea typeface="+mn-ea"/>
+                <a:cs typeface="+mn-cs"/>
+              </a:defRPr>
+            </a:lvl6pPr>
+            <a:lvl7pPr marL="2971800" indent="-228600" algn="l" defTabSz="457200" rtl="0" eaLnBrk="1" latinLnBrk="0" hangingPunct="1">
+              <a:spcBef>
+                <a:spcPct val="20000"/>
+              </a:spcBef>
+              <a:spcAft>
+                <a:spcPts val="600"/>
+              </a:spcAft>
+              <a:buClr>
+                <a:schemeClr val="accent1"/>
+              </a:buClr>
+              <a:buSzPct val="100000"/>
+              <a:buFont typeface="Arial"/>
+              <a:buChar char="•"/>
+              <a:defRPr sz="1200" kern="1200" cap="small">
+                <a:solidFill>
+                  <a:schemeClr val="tx1"/>
+                </a:solidFill>
+                <a:effectLst>
+                  <a:glow rad="38100">
+                    <a:schemeClr val="bg1">
+                      <a:lumMod val="50000"/>
+                      <a:lumOff val="50000"/>
+                      <a:alpha val="20000"/>
+                    </a:schemeClr>
+                  </a:glow>
+                  <a:outerShdw blurRad="44450" dist="12700" dir="13860000" algn="tl" rotWithShape="0">
+                    <a:srgbClr val="000000">
+                      <a:alpha val="20000"/>
+                    </a:srgbClr>
+                  </a:outerShdw>
+                </a:effectLst>
+                <a:latin typeface="+mn-lt"/>
+                <a:ea typeface="+mn-ea"/>
+                <a:cs typeface="+mn-cs"/>
+              </a:defRPr>
+            </a:lvl7pPr>
+            <a:lvl8pPr marL="3429000" indent="-228600" algn="l" defTabSz="457200" rtl="0" eaLnBrk="1" latinLnBrk="0" hangingPunct="1">
+              <a:spcBef>
+                <a:spcPct val="20000"/>
+              </a:spcBef>
+              <a:spcAft>
+                <a:spcPts val="600"/>
+              </a:spcAft>
+              <a:buClr>
+                <a:schemeClr val="accent1"/>
+              </a:buClr>
+              <a:buSzPct val="100000"/>
+              <a:buFont typeface="Arial"/>
+              <a:buChar char="•"/>
+              <a:defRPr sz="1200" kern="1200" cap="small">
+                <a:solidFill>
+                  <a:schemeClr val="tx1"/>
+                </a:solidFill>
+                <a:effectLst>
+                  <a:glow rad="38100">
+                    <a:schemeClr val="bg1">
+                      <a:lumMod val="50000"/>
+                      <a:lumOff val="50000"/>
+                      <a:alpha val="20000"/>
+                    </a:schemeClr>
+                  </a:glow>
+                  <a:outerShdw blurRad="44450" dist="12700" dir="13860000" algn="tl" rotWithShape="0">
+                    <a:srgbClr val="000000">
+                      <a:alpha val="20000"/>
+                    </a:srgbClr>
+                  </a:outerShdw>
+                </a:effectLst>
+                <a:latin typeface="+mn-lt"/>
+                <a:ea typeface="+mn-ea"/>
+                <a:cs typeface="+mn-cs"/>
+              </a:defRPr>
+            </a:lvl8pPr>
+            <a:lvl9pPr marL="3886200" indent="-228600" algn="l" defTabSz="457200" rtl="0" eaLnBrk="1" latinLnBrk="0" hangingPunct="1">
+              <a:spcBef>
+                <a:spcPct val="20000"/>
+              </a:spcBef>
+              <a:spcAft>
+                <a:spcPts val="600"/>
+              </a:spcAft>
+              <a:buClr>
+                <a:schemeClr val="accent1"/>
+              </a:buClr>
+              <a:buSzPct val="100000"/>
+              <a:buFont typeface="Arial"/>
+              <a:buChar char="•"/>
+              <a:defRPr sz="1200" kern="1200" cap="small">
+                <a:solidFill>
+                  <a:schemeClr val="tx1"/>
+                </a:solidFill>
+                <a:effectLst>
+                  <a:glow rad="38100">
+                    <a:schemeClr val="bg1">
+                      <a:lumMod val="50000"/>
+                      <a:lumOff val="50000"/>
+                      <a:alpha val="20000"/>
+                    </a:schemeClr>
+                  </a:glow>
+                  <a:outerShdw blurRad="44450" dist="12700" dir="13860000" algn="tl" rotWithShape="0">
+                    <a:srgbClr val="000000">
+                      <a:alpha val="20000"/>
+                    </a:srgbClr>
+                  </a:outerShdw>
+                </a:effectLst>
+                <a:latin typeface="+mn-lt"/>
+                <a:ea typeface="+mn-ea"/>
+                <a:cs typeface="+mn-cs"/>
+              </a:defRPr>
+            </a:lvl9pPr>
+          </a:lstStyle>
           <a:p>
             <a:pPr marL="0" indent="0">
-              <a:buNone/>
-            </a:pPr>
-            <a:endParaRPr lang="en-US" dirty="0"/>
-          </a:p>
-          <a:p>
-            <a:pPr marL="0" indent="0">
+              <a:buFont typeface="Arial"/>
               <a:buNone/>
             </a:pPr>
             <a:r>
@@ -9499,37 +9551,21 @@
           </a:p>
           <a:p>
             <a:r>
-              <a:rPr lang="en-US" dirty="0">
-                <a:effectLst/>
-              </a:rPr>
-              <a:t>Taxi driving is well defined and regulated in cities like New York. We collected yellow taxi data to understand recent trends in fares and miles driven. </a:t>
-            </a:r>
-          </a:p>
-          <a:p>
-            <a:r>
-              <a:rPr lang="en-US" i="1" dirty="0">
-                <a:effectLst/>
-              </a:rPr>
-              <a:t>On average, a taxi driver drives 3 miles and charges around $15 per trip. </a:t>
-            </a:r>
-            <a:endParaRPr lang="en-US" dirty="0">
-              <a:effectLst/>
-            </a:endParaRPr>
-          </a:p>
-          <a:p>
-            <a:pPr marL="0" indent="0">
-              <a:buNone/>
-            </a:pPr>
+              <a:rPr lang="en-US" sz="1700" dirty="0"/>
+              <a:t>The number of Accidents with fatalities is trending upwards in Dallas, while San Diego’s trend is neutral.</a:t>
+            </a:r>
+          </a:p>
+          <a:p>
             <a:endParaRPr lang="en-US" dirty="0"/>
           </a:p>
         </p:txBody>
       </p:sp>
       <p:sp>
         <p:nvSpPr>
-          <p:cNvPr id="15" name="TextBox 14">
+          <p:cNvPr id="10" name="TextBox 9">
             <a:extLst>
               <a:ext uri="{FF2B5EF4-FFF2-40B4-BE49-F238E27FC236}">
-                <a16:creationId xmlns:a16="http://schemas.microsoft.com/office/drawing/2014/main" id="{B239CC83-BE04-D243-9487-985E3A9E8D08}"/>
+                <a16:creationId xmlns:a16="http://schemas.microsoft.com/office/drawing/2014/main" id="{940778FD-6E87-FD43-B986-32F8D66F54C6}"/>
               </a:ext>
             </a:extLst>
           </p:cNvPr>
@@ -9553,23 +9589,23 @@
           <a:lstStyle/>
           <a:p>
             <a:r>
-              <a:rPr lang="en-US" sz="1200" dirty="0"/>
+              <a:rPr lang="en-US" sz="1200" i="1" dirty="0"/>
               <a:t>source:   https://</a:t>
             </a:r>
             <a:r>
-              <a:rPr lang="en-US" sz="1200" dirty="0" err="1"/>
-              <a:t>opendata.cityofnewyork.us</a:t>
-            </a:r>
-            <a:endParaRPr lang="en-US" sz="1200" dirty="0"/>
+              <a:rPr lang="en-US" sz="1200" i="1" dirty="0" err="1"/>
+              <a:t>crashviewer.nhtsa.dot.gov</a:t>
+            </a:r>
+            <a:endParaRPr lang="en-US" sz="1200" i="1" dirty="0"/>
           </a:p>
         </p:txBody>
       </p:sp>
       <p:pic>
         <p:nvPicPr>
-          <p:cNvPr id="5" name="Picture 4">
+          <p:cNvPr id="4" name="Picture 3" descr="A screenshot of a cell phone&#10;&#10;Description automatically generated">
             <a:extLst>
               <a:ext uri="{FF2B5EF4-FFF2-40B4-BE49-F238E27FC236}">
-                <a16:creationId xmlns:a16="http://schemas.microsoft.com/office/drawing/2014/main" id="{8EDFB280-ACB2-2149-B3B8-6AB49A2398B4}"/>
+                <a16:creationId xmlns:a16="http://schemas.microsoft.com/office/drawing/2014/main" id="{2B25A7C4-102E-EE42-A141-6479C61D87C9}"/>
               </a:ext>
             </a:extLst>
           </p:cNvPr>
@@ -9579,15 +9615,15 @@
           <p:nvPr/>
         </p:nvPicPr>
         <p:blipFill>
-          <a:blip r:embed="rId3"/>
+          <a:blip r:embed="rId4"/>
           <a:stretch>
             <a:fillRect/>
           </a:stretch>
         </p:blipFill>
         <p:spPr>
           <a:xfrm>
-            <a:off x="254758" y="1828800"/>
-            <a:ext cx="5486400" cy="3657600"/>
+            <a:off x="6324563" y="419099"/>
+            <a:ext cx="5622720" cy="3362956"/>
           </a:xfrm>
           <a:prstGeom prst="rect">
             <a:avLst/>
@@ -9597,7 +9633,7 @@
     </p:spTree>
     <p:extLst>
       <p:ext uri="{BB962C8B-B14F-4D97-AF65-F5344CB8AC3E}">
-        <p14:creationId xmlns:p14="http://schemas.microsoft.com/office/powerpoint/2010/main" val="2551876641"/>
+        <p14:creationId xmlns:p14="http://schemas.microsoft.com/office/powerpoint/2010/main" val="1595918270"/>
       </p:ext>
     </p:extLst>
   </p:cSld>

</xml_diff>